<commit_message>
Added more Diagrams to the presentation
</commit_message>
<xml_diff>
--- a/Documentation/Umbra - Game Design Patterns.pptx
+++ b/Documentation/Umbra - Game Design Patterns.pptx
@@ -1,26 +1,123 @@
 
 <file path=ppt/presentation.xml><?xml version="1.0" encoding="utf-8"?>
-<p:presentation xmlns:a="http://schemas.openxmlformats.org/drawingml/2006/main" xmlns:p="http://schemas.openxmlformats.org/presentationml/2006/main" xmlns:r="http://schemas.openxmlformats.org/officeDocument/2006/relationships">
+<p:presentation xmlns:a="http://schemas.openxmlformats.org/drawingml/2006/main" xmlns:r="http://schemas.openxmlformats.org/officeDocument/2006/relationships" xmlns:p="http://schemas.openxmlformats.org/presentationml/2006/main">
   <p:sldMasterIdLst>
-    <p:sldMasterId id="2147483648" r:id="rId2"/>
-    <p:sldMasterId id="2147483661" r:id="rId3"/>
+    <p:sldMasterId id="2147483648" r:id="rId1"/>
+    <p:sldMasterId id="2147483661" r:id="rId2"/>
   </p:sldMasterIdLst>
   <p:sldIdLst>
-    <p:sldId id="256" r:id="rId4"/>
-    <p:sldId id="257" r:id="rId5"/>
-    <p:sldId id="258" r:id="rId6"/>
-    <p:sldId id="259" r:id="rId7"/>
-    <p:sldId id="260" r:id="rId8"/>
-    <p:sldId id="261" r:id="rId9"/>
-    <p:sldId id="262" r:id="rId10"/>
+    <p:sldId id="256" r:id="rId3"/>
+    <p:sldId id="257" r:id="rId4"/>
+    <p:sldId id="258" r:id="rId5"/>
+    <p:sldId id="259" r:id="rId6"/>
+    <p:sldId id="260" r:id="rId7"/>
+    <p:sldId id="261" r:id="rId8"/>
+    <p:sldId id="262" r:id="rId9"/>
+    <p:sldId id="264" r:id="rId10"/>
+    <p:sldId id="263" r:id="rId11"/>
   </p:sldIdLst>
-  <p:sldSz cx="9144000" cy="6858000"/>
+  <p:sldSz cx="9144000" cy="6858000" type="screen4x3"/>
   <p:notesSz cx="7772400" cy="10058400"/>
+  <p:defaultTextStyle>
+    <a:defPPr>
+      <a:defRPr lang="en-US"/>
+    </a:defPPr>
+    <a:lvl1pPr marL="0" algn="l" defTabSz="457200" rtl="0" eaLnBrk="1" latinLnBrk="0" hangingPunct="1">
+      <a:defRPr sz="1800" kern="1200">
+        <a:solidFill>
+          <a:schemeClr val="tx1"/>
+        </a:solidFill>
+        <a:latin typeface="+mn-lt"/>
+        <a:ea typeface="+mn-ea"/>
+        <a:cs typeface="+mn-cs"/>
+      </a:defRPr>
+    </a:lvl1pPr>
+    <a:lvl2pPr marL="457200" algn="l" defTabSz="457200" rtl="0" eaLnBrk="1" latinLnBrk="0" hangingPunct="1">
+      <a:defRPr sz="1800" kern="1200">
+        <a:solidFill>
+          <a:schemeClr val="tx1"/>
+        </a:solidFill>
+        <a:latin typeface="+mn-lt"/>
+        <a:ea typeface="+mn-ea"/>
+        <a:cs typeface="+mn-cs"/>
+      </a:defRPr>
+    </a:lvl2pPr>
+    <a:lvl3pPr marL="914400" algn="l" defTabSz="457200" rtl="0" eaLnBrk="1" latinLnBrk="0" hangingPunct="1">
+      <a:defRPr sz="1800" kern="1200">
+        <a:solidFill>
+          <a:schemeClr val="tx1"/>
+        </a:solidFill>
+        <a:latin typeface="+mn-lt"/>
+        <a:ea typeface="+mn-ea"/>
+        <a:cs typeface="+mn-cs"/>
+      </a:defRPr>
+    </a:lvl3pPr>
+    <a:lvl4pPr marL="1371600" algn="l" defTabSz="457200" rtl="0" eaLnBrk="1" latinLnBrk="0" hangingPunct="1">
+      <a:defRPr sz="1800" kern="1200">
+        <a:solidFill>
+          <a:schemeClr val="tx1"/>
+        </a:solidFill>
+        <a:latin typeface="+mn-lt"/>
+        <a:ea typeface="+mn-ea"/>
+        <a:cs typeface="+mn-cs"/>
+      </a:defRPr>
+    </a:lvl4pPr>
+    <a:lvl5pPr marL="1828800" algn="l" defTabSz="457200" rtl="0" eaLnBrk="1" latinLnBrk="0" hangingPunct="1">
+      <a:defRPr sz="1800" kern="1200">
+        <a:solidFill>
+          <a:schemeClr val="tx1"/>
+        </a:solidFill>
+        <a:latin typeface="+mn-lt"/>
+        <a:ea typeface="+mn-ea"/>
+        <a:cs typeface="+mn-cs"/>
+      </a:defRPr>
+    </a:lvl5pPr>
+    <a:lvl6pPr marL="2286000" algn="l" defTabSz="457200" rtl="0" eaLnBrk="1" latinLnBrk="0" hangingPunct="1">
+      <a:defRPr sz="1800" kern="1200">
+        <a:solidFill>
+          <a:schemeClr val="tx1"/>
+        </a:solidFill>
+        <a:latin typeface="+mn-lt"/>
+        <a:ea typeface="+mn-ea"/>
+        <a:cs typeface="+mn-cs"/>
+      </a:defRPr>
+    </a:lvl6pPr>
+    <a:lvl7pPr marL="2743200" algn="l" defTabSz="457200" rtl="0" eaLnBrk="1" latinLnBrk="0" hangingPunct="1">
+      <a:defRPr sz="1800" kern="1200">
+        <a:solidFill>
+          <a:schemeClr val="tx1"/>
+        </a:solidFill>
+        <a:latin typeface="+mn-lt"/>
+        <a:ea typeface="+mn-ea"/>
+        <a:cs typeface="+mn-cs"/>
+      </a:defRPr>
+    </a:lvl7pPr>
+    <a:lvl8pPr marL="3200400" algn="l" defTabSz="457200" rtl="0" eaLnBrk="1" latinLnBrk="0" hangingPunct="1">
+      <a:defRPr sz="1800" kern="1200">
+        <a:solidFill>
+          <a:schemeClr val="tx1"/>
+        </a:solidFill>
+        <a:latin typeface="+mn-lt"/>
+        <a:ea typeface="+mn-ea"/>
+        <a:cs typeface="+mn-cs"/>
+      </a:defRPr>
+    </a:lvl8pPr>
+    <a:lvl9pPr marL="3657600" algn="l" defTabSz="457200" rtl="0" eaLnBrk="1" latinLnBrk="0" hangingPunct="1">
+      <a:defRPr sz="1800" kern="1200">
+        <a:solidFill>
+          <a:schemeClr val="tx1"/>
+        </a:solidFill>
+        <a:latin typeface="+mn-lt"/>
+        <a:ea typeface="+mn-ea"/>
+        <a:cs typeface="+mn-cs"/>
+      </a:defRPr>
+    </a:lvl9pPr>
+  </p:defaultTextStyle>
 </p:presentation>
 </file>
 
 <file path=ppt/slideLayouts/slideLayout1.xml><?xml version="1.0" encoding="utf-8"?>
-<p:sldLayout xmlns:a="http://schemas.openxmlformats.org/drawingml/2006/main" xmlns:p="http://schemas.openxmlformats.org/presentationml/2006/main" xmlns:r="http://schemas.openxmlformats.org/officeDocument/2006/relationships" type="blank" preserve="1">
+<p:sldLayout xmlns:a="http://schemas.openxmlformats.org/drawingml/2006/main" xmlns:r="http://schemas.openxmlformats.org/officeDocument/2006/relationships" xmlns:p="http://schemas.openxmlformats.org/presentationml/2006/main" type="blank" preserve="1">
   <p:cSld name="Blank Slide">
     <p:spTree>
       <p:nvGrpSpPr>
@@ -38,11 +135,14 @@
       </p:grpSpPr>
     </p:spTree>
   </p:cSld>
+  <p:clrMapOvr>
+    <a:masterClrMapping/>
+  </p:clrMapOvr>
 </p:sldLayout>
 </file>
 
 <file path=ppt/slideLayouts/slideLayout10.xml><?xml version="1.0" encoding="utf-8"?>
-<p:sldLayout xmlns:a="http://schemas.openxmlformats.org/drawingml/2006/main" xmlns:p="http://schemas.openxmlformats.org/presentationml/2006/main" xmlns:r="http://schemas.openxmlformats.org/officeDocument/2006/relationships" type="objOverTx" preserve="1">
+<p:sldLayout xmlns:a="http://schemas.openxmlformats.org/drawingml/2006/main" xmlns:r="http://schemas.openxmlformats.org/officeDocument/2006/relationships" xmlns:p="http://schemas.openxmlformats.org/presentationml/2006/main" type="objOverTx" preserve="1">
   <p:cSld name="Title, Content over Content">
     <p:spTree>
       <p:nvGrpSpPr>
@@ -78,7 +178,8 @@
           </a:prstGeom>
         </p:spPr>
         <p:txBody>
-          <a:bodyPr lIns="0" rIns="0" tIns="0" bIns="0" anchor="ctr"/>
+          <a:bodyPr lIns="0" tIns="0" rIns="0" bIns="0" anchor="ctr"/>
+          <a:lstStyle/>
           <a:p>
             <a:endParaRPr/>
           </a:p>
@@ -104,7 +205,8 @@
           </a:prstGeom>
         </p:spPr>
         <p:txBody>
-          <a:bodyPr lIns="0" rIns="0" tIns="0" bIns="0"/>
+          <a:bodyPr lIns="0" tIns="0" rIns="0" bIns="0"/>
+          <a:lstStyle/>
           <a:p>
             <a:endParaRPr/>
           </a:p>
@@ -130,7 +232,8 @@
           </a:prstGeom>
         </p:spPr>
         <p:txBody>
-          <a:bodyPr lIns="0" rIns="0" tIns="0" bIns="0"/>
+          <a:bodyPr lIns="0" tIns="0" rIns="0" bIns="0"/>
+          <a:lstStyle/>
           <a:p>
             <a:endParaRPr/>
           </a:p>
@@ -138,11 +241,14 @@
       </p:sp>
     </p:spTree>
   </p:cSld>
+  <p:clrMapOvr>
+    <a:masterClrMapping/>
+  </p:clrMapOvr>
 </p:sldLayout>
 </file>
 
 <file path=ppt/slideLayouts/slideLayout11.xml><?xml version="1.0" encoding="utf-8"?>
-<p:sldLayout xmlns:a="http://schemas.openxmlformats.org/drawingml/2006/main" xmlns:p="http://schemas.openxmlformats.org/presentationml/2006/main" xmlns:r="http://schemas.openxmlformats.org/officeDocument/2006/relationships" type="fourObj" preserve="1">
+<p:sldLayout xmlns:a="http://schemas.openxmlformats.org/drawingml/2006/main" xmlns:r="http://schemas.openxmlformats.org/officeDocument/2006/relationships" xmlns:p="http://schemas.openxmlformats.org/presentationml/2006/main" type="fourObj" preserve="1">
   <p:cSld name="Title, 4 Content">
     <p:spTree>
       <p:nvGrpSpPr>
@@ -178,7 +284,8 @@
           </a:prstGeom>
         </p:spPr>
         <p:txBody>
-          <a:bodyPr lIns="0" rIns="0" tIns="0" bIns="0" anchor="ctr"/>
+          <a:bodyPr lIns="0" tIns="0" rIns="0" bIns="0" anchor="ctr"/>
+          <a:lstStyle/>
           <a:p>
             <a:endParaRPr/>
           </a:p>
@@ -204,7 +311,8 @@
           </a:prstGeom>
         </p:spPr>
         <p:txBody>
-          <a:bodyPr lIns="0" rIns="0" tIns="0" bIns="0"/>
+          <a:bodyPr lIns="0" tIns="0" rIns="0" bIns="0"/>
+          <a:lstStyle/>
           <a:p>
             <a:endParaRPr/>
           </a:p>
@@ -230,7 +338,8 @@
           </a:prstGeom>
         </p:spPr>
         <p:txBody>
-          <a:bodyPr lIns="0" rIns="0" tIns="0" bIns="0"/>
+          <a:bodyPr lIns="0" tIns="0" rIns="0" bIns="0"/>
+          <a:lstStyle/>
           <a:p>
             <a:endParaRPr/>
           </a:p>
@@ -256,7 +365,8 @@
           </a:prstGeom>
         </p:spPr>
         <p:txBody>
-          <a:bodyPr lIns="0" rIns="0" tIns="0" bIns="0"/>
+          <a:bodyPr lIns="0" tIns="0" rIns="0" bIns="0"/>
+          <a:lstStyle/>
           <a:p>
             <a:endParaRPr/>
           </a:p>
@@ -282,7 +392,8 @@
           </a:prstGeom>
         </p:spPr>
         <p:txBody>
-          <a:bodyPr lIns="0" rIns="0" tIns="0" bIns="0"/>
+          <a:bodyPr lIns="0" tIns="0" rIns="0" bIns="0"/>
+          <a:lstStyle/>
           <a:p>
             <a:endParaRPr/>
           </a:p>
@@ -290,11 +401,14 @@
       </p:sp>
     </p:spTree>
   </p:cSld>
+  <p:clrMapOvr>
+    <a:masterClrMapping/>
+  </p:clrMapOvr>
 </p:sldLayout>
 </file>
 
 <file path=ppt/slideLayouts/slideLayout12.xml><?xml version="1.0" encoding="utf-8"?>
-<p:sldLayout xmlns:a="http://schemas.openxmlformats.org/drawingml/2006/main" xmlns:p="http://schemas.openxmlformats.org/presentationml/2006/main" xmlns:r="http://schemas.openxmlformats.org/officeDocument/2006/relationships" type="blank" preserve="1">
+<p:sldLayout xmlns:a="http://schemas.openxmlformats.org/drawingml/2006/main" xmlns:r="http://schemas.openxmlformats.org/officeDocument/2006/relationships" xmlns:p="http://schemas.openxmlformats.org/presentationml/2006/main" type="blank" preserve="1">
   <p:cSld name="Title, 6 Content">
     <p:spTree>
       <p:nvGrpSpPr>
@@ -330,7 +444,8 @@
           </a:prstGeom>
         </p:spPr>
         <p:txBody>
-          <a:bodyPr lIns="0" rIns="0" tIns="0" bIns="0" anchor="ctr"/>
+          <a:bodyPr lIns="0" tIns="0" rIns="0" bIns="0" anchor="ctr"/>
+          <a:lstStyle/>
           <a:p>
             <a:endParaRPr/>
           </a:p>
@@ -356,7 +471,8 @@
           </a:prstGeom>
         </p:spPr>
         <p:txBody>
-          <a:bodyPr lIns="0" rIns="0" tIns="0" bIns="0"/>
+          <a:bodyPr lIns="0" tIns="0" rIns="0" bIns="0"/>
+          <a:lstStyle/>
           <a:p>
             <a:endParaRPr/>
           </a:p>
@@ -382,7 +498,8 @@
           </a:prstGeom>
         </p:spPr>
         <p:txBody>
-          <a:bodyPr lIns="0" rIns="0" tIns="0" bIns="0"/>
+          <a:bodyPr lIns="0" tIns="0" rIns="0" bIns="0"/>
+          <a:lstStyle/>
           <a:p>
             <a:endParaRPr/>
           </a:p>
@@ -390,7 +507,7 @@
       </p:sp>
       <p:pic>
         <p:nvPicPr>
-          <p:cNvPr id="37" name="" descr=""/>
+          <p:cNvPr id="37" name="Picture 36"/>
           <p:cNvPicPr/>
           <p:nvPr/>
         </p:nvPicPr>
@@ -413,12 +530,12 @@
       </p:pic>
       <p:pic>
         <p:nvPicPr>
-          <p:cNvPr id="38" name="" descr=""/>
+          <p:cNvPr id="38" name="Picture 37"/>
           <p:cNvPicPr/>
           <p:nvPr/>
         </p:nvPicPr>
         <p:blipFill>
-          <a:blip r:embed="rId3"/>
+          <a:blip r:embed="rId2"/>
           <a:stretch/>
         </p:blipFill>
         <p:spPr>
@@ -436,11 +553,14 @@
       </p:pic>
     </p:spTree>
   </p:cSld>
+  <p:clrMapOvr>
+    <a:masterClrMapping/>
+  </p:clrMapOvr>
 </p:sldLayout>
 </file>
 
 <file path=ppt/slideLayouts/slideLayout13.xml><?xml version="1.0" encoding="utf-8"?>
-<p:sldLayout xmlns:a="http://schemas.openxmlformats.org/drawingml/2006/main" xmlns:p="http://schemas.openxmlformats.org/presentationml/2006/main" xmlns:r="http://schemas.openxmlformats.org/officeDocument/2006/relationships" type="blank" preserve="1">
+<p:sldLayout xmlns:a="http://schemas.openxmlformats.org/drawingml/2006/main" xmlns:r="http://schemas.openxmlformats.org/officeDocument/2006/relationships" xmlns:p="http://schemas.openxmlformats.org/presentationml/2006/main" type="blank" preserve="1">
   <p:cSld name="Blank Slide">
     <p:spTree>
       <p:nvGrpSpPr>
@@ -458,11 +578,14 @@
       </p:grpSpPr>
     </p:spTree>
   </p:cSld>
+  <p:clrMapOvr>
+    <a:masterClrMapping/>
+  </p:clrMapOvr>
 </p:sldLayout>
 </file>
 
 <file path=ppt/slideLayouts/slideLayout14.xml><?xml version="1.0" encoding="utf-8"?>
-<p:sldLayout xmlns:a="http://schemas.openxmlformats.org/drawingml/2006/main" xmlns:p="http://schemas.openxmlformats.org/presentationml/2006/main" xmlns:r="http://schemas.openxmlformats.org/officeDocument/2006/relationships" type="tx" preserve="1">
+<p:sldLayout xmlns:a="http://schemas.openxmlformats.org/drawingml/2006/main" xmlns:r="http://schemas.openxmlformats.org/officeDocument/2006/relationships" xmlns:p="http://schemas.openxmlformats.org/presentationml/2006/main" type="tx" preserve="1">
   <p:cSld name="Title Slide">
     <p:spTree>
       <p:nvGrpSpPr>
@@ -498,7 +621,8 @@
           </a:prstGeom>
         </p:spPr>
         <p:txBody>
-          <a:bodyPr lIns="0" rIns="0" tIns="0" bIns="0" anchor="ctr"/>
+          <a:bodyPr lIns="0" tIns="0" rIns="0" bIns="0" anchor="ctr"/>
+          <a:lstStyle/>
           <a:p>
             <a:endParaRPr/>
           </a:p>
@@ -524,7 +648,8 @@
           </a:prstGeom>
         </p:spPr>
         <p:txBody>
-          <a:bodyPr lIns="0" rIns="0" tIns="0" bIns="0" anchor="ctr"/>
+          <a:bodyPr lIns="0" tIns="0" rIns="0" bIns="0" anchor="ctr"/>
+          <a:lstStyle/>
           <a:p>
             <a:pPr algn="ctr"/>
             <a:endParaRPr/>
@@ -533,11 +658,14 @@
       </p:sp>
     </p:spTree>
   </p:cSld>
+  <p:clrMapOvr>
+    <a:masterClrMapping/>
+  </p:clrMapOvr>
 </p:sldLayout>
 </file>
 
 <file path=ppt/slideLayouts/slideLayout15.xml><?xml version="1.0" encoding="utf-8"?>
-<p:sldLayout xmlns:a="http://schemas.openxmlformats.org/drawingml/2006/main" xmlns:p="http://schemas.openxmlformats.org/presentationml/2006/main" xmlns:r="http://schemas.openxmlformats.org/officeDocument/2006/relationships" type="obj" preserve="1">
+<p:sldLayout xmlns:a="http://schemas.openxmlformats.org/drawingml/2006/main" xmlns:r="http://schemas.openxmlformats.org/officeDocument/2006/relationships" xmlns:p="http://schemas.openxmlformats.org/presentationml/2006/main" type="obj" preserve="1">
   <p:cSld name="Title, Content">
     <p:spTree>
       <p:nvGrpSpPr>
@@ -573,7 +701,8 @@
           </a:prstGeom>
         </p:spPr>
         <p:txBody>
-          <a:bodyPr lIns="0" rIns="0" tIns="0" bIns="0" anchor="ctr"/>
+          <a:bodyPr lIns="0" tIns="0" rIns="0" bIns="0" anchor="ctr"/>
+          <a:lstStyle/>
           <a:p>
             <a:endParaRPr/>
           </a:p>
@@ -599,7 +728,8 @@
           </a:prstGeom>
         </p:spPr>
         <p:txBody>
-          <a:bodyPr lIns="0" rIns="0" tIns="0" bIns="0"/>
+          <a:bodyPr lIns="0" tIns="0" rIns="0" bIns="0"/>
+          <a:lstStyle/>
           <a:p>
             <a:endParaRPr/>
           </a:p>
@@ -607,11 +737,14 @@
       </p:sp>
     </p:spTree>
   </p:cSld>
+  <p:clrMapOvr>
+    <a:masterClrMapping/>
+  </p:clrMapOvr>
 </p:sldLayout>
 </file>
 
 <file path=ppt/slideLayouts/slideLayout16.xml><?xml version="1.0" encoding="utf-8"?>
-<p:sldLayout xmlns:a="http://schemas.openxmlformats.org/drawingml/2006/main" xmlns:p="http://schemas.openxmlformats.org/presentationml/2006/main" xmlns:r="http://schemas.openxmlformats.org/officeDocument/2006/relationships" type="twoObj" preserve="1">
+<p:sldLayout xmlns:a="http://schemas.openxmlformats.org/drawingml/2006/main" xmlns:r="http://schemas.openxmlformats.org/officeDocument/2006/relationships" xmlns:p="http://schemas.openxmlformats.org/presentationml/2006/main" type="twoObj" preserve="1">
   <p:cSld name="Title, 2 Content">
     <p:spTree>
       <p:nvGrpSpPr>
@@ -647,7 +780,8 @@
           </a:prstGeom>
         </p:spPr>
         <p:txBody>
-          <a:bodyPr lIns="0" rIns="0" tIns="0" bIns="0" anchor="ctr"/>
+          <a:bodyPr lIns="0" tIns="0" rIns="0" bIns="0" anchor="ctr"/>
+          <a:lstStyle/>
           <a:p>
             <a:endParaRPr/>
           </a:p>
@@ -673,7 +807,8 @@
           </a:prstGeom>
         </p:spPr>
         <p:txBody>
-          <a:bodyPr lIns="0" rIns="0" tIns="0" bIns="0"/>
+          <a:bodyPr lIns="0" tIns="0" rIns="0" bIns="0"/>
+          <a:lstStyle/>
           <a:p>
             <a:endParaRPr/>
           </a:p>
@@ -699,7 +834,8 @@
           </a:prstGeom>
         </p:spPr>
         <p:txBody>
-          <a:bodyPr lIns="0" rIns="0" tIns="0" bIns="0"/>
+          <a:bodyPr lIns="0" tIns="0" rIns="0" bIns="0"/>
+          <a:lstStyle/>
           <a:p>
             <a:endParaRPr/>
           </a:p>
@@ -707,11 +843,14 @@
       </p:sp>
     </p:spTree>
   </p:cSld>
+  <p:clrMapOvr>
+    <a:masterClrMapping/>
+  </p:clrMapOvr>
 </p:sldLayout>
 </file>
 
 <file path=ppt/slideLayouts/slideLayout17.xml><?xml version="1.0" encoding="utf-8"?>
-<p:sldLayout xmlns:a="http://schemas.openxmlformats.org/drawingml/2006/main" xmlns:p="http://schemas.openxmlformats.org/presentationml/2006/main" xmlns:r="http://schemas.openxmlformats.org/officeDocument/2006/relationships" type="titleOnly" preserve="1">
+<p:sldLayout xmlns:a="http://schemas.openxmlformats.org/drawingml/2006/main" xmlns:r="http://schemas.openxmlformats.org/officeDocument/2006/relationships" xmlns:p="http://schemas.openxmlformats.org/presentationml/2006/main" type="titleOnly" preserve="1">
   <p:cSld name="Title Only">
     <p:spTree>
       <p:nvGrpSpPr>
@@ -747,7 +886,8 @@
           </a:prstGeom>
         </p:spPr>
         <p:txBody>
-          <a:bodyPr lIns="0" rIns="0" tIns="0" bIns="0" anchor="ctr"/>
+          <a:bodyPr lIns="0" tIns="0" rIns="0" bIns="0" anchor="ctr"/>
+          <a:lstStyle/>
           <a:p>
             <a:endParaRPr/>
           </a:p>
@@ -755,11 +895,14 @@
       </p:sp>
     </p:spTree>
   </p:cSld>
+  <p:clrMapOvr>
+    <a:masterClrMapping/>
+  </p:clrMapOvr>
 </p:sldLayout>
 </file>
 
 <file path=ppt/slideLayouts/slideLayout18.xml><?xml version="1.0" encoding="utf-8"?>
-<p:sldLayout xmlns:a="http://schemas.openxmlformats.org/drawingml/2006/main" xmlns:p="http://schemas.openxmlformats.org/presentationml/2006/main" xmlns:r="http://schemas.openxmlformats.org/officeDocument/2006/relationships" type="objOnly" preserve="1">
+<p:sldLayout xmlns:a="http://schemas.openxmlformats.org/drawingml/2006/main" xmlns:r="http://schemas.openxmlformats.org/officeDocument/2006/relationships" xmlns:p="http://schemas.openxmlformats.org/presentationml/2006/main" type="objOnly" preserve="1">
   <p:cSld name="Centered Text">
     <p:spTree>
       <p:nvGrpSpPr>
@@ -795,7 +938,8 @@
           </a:prstGeom>
         </p:spPr>
         <p:txBody>
-          <a:bodyPr lIns="0" rIns="0" tIns="0" bIns="0" anchor="ctr"/>
+          <a:bodyPr lIns="0" tIns="0" rIns="0" bIns="0" anchor="ctr"/>
+          <a:lstStyle/>
           <a:p>
             <a:pPr algn="ctr"/>
             <a:endParaRPr/>
@@ -804,11 +948,14 @@
       </p:sp>
     </p:spTree>
   </p:cSld>
+  <p:clrMapOvr>
+    <a:masterClrMapping/>
+  </p:clrMapOvr>
 </p:sldLayout>
 </file>
 
 <file path=ppt/slideLayouts/slideLayout19.xml><?xml version="1.0" encoding="utf-8"?>
-<p:sldLayout xmlns:a="http://schemas.openxmlformats.org/drawingml/2006/main" xmlns:p="http://schemas.openxmlformats.org/presentationml/2006/main" xmlns:r="http://schemas.openxmlformats.org/officeDocument/2006/relationships" type="twoObjAndObj" preserve="1">
+<p:sldLayout xmlns:a="http://schemas.openxmlformats.org/drawingml/2006/main" xmlns:r="http://schemas.openxmlformats.org/officeDocument/2006/relationships" xmlns:p="http://schemas.openxmlformats.org/presentationml/2006/main" type="twoObjAndObj" preserve="1">
   <p:cSld name="Title, 2 Content and Content">
     <p:spTree>
       <p:nvGrpSpPr>
@@ -844,7 +991,8 @@
           </a:prstGeom>
         </p:spPr>
         <p:txBody>
-          <a:bodyPr lIns="0" rIns="0" tIns="0" bIns="0" anchor="ctr"/>
+          <a:bodyPr lIns="0" tIns="0" rIns="0" bIns="0" anchor="ctr"/>
+          <a:lstStyle/>
           <a:p>
             <a:endParaRPr/>
           </a:p>
@@ -870,7 +1018,8 @@
           </a:prstGeom>
         </p:spPr>
         <p:txBody>
-          <a:bodyPr lIns="0" rIns="0" tIns="0" bIns="0"/>
+          <a:bodyPr lIns="0" tIns="0" rIns="0" bIns="0"/>
+          <a:lstStyle/>
           <a:p>
             <a:endParaRPr/>
           </a:p>
@@ -896,7 +1045,8 @@
           </a:prstGeom>
         </p:spPr>
         <p:txBody>
-          <a:bodyPr lIns="0" rIns="0" tIns="0" bIns="0"/>
+          <a:bodyPr lIns="0" tIns="0" rIns="0" bIns="0"/>
+          <a:lstStyle/>
           <a:p>
             <a:endParaRPr/>
           </a:p>
@@ -922,7 +1072,8 @@
           </a:prstGeom>
         </p:spPr>
         <p:txBody>
-          <a:bodyPr lIns="0" rIns="0" tIns="0" bIns="0"/>
+          <a:bodyPr lIns="0" tIns="0" rIns="0" bIns="0"/>
+          <a:lstStyle/>
           <a:p>
             <a:endParaRPr/>
           </a:p>
@@ -930,11 +1081,14 @@
       </p:sp>
     </p:spTree>
   </p:cSld>
+  <p:clrMapOvr>
+    <a:masterClrMapping/>
+  </p:clrMapOvr>
 </p:sldLayout>
 </file>
 
 <file path=ppt/slideLayouts/slideLayout2.xml><?xml version="1.0" encoding="utf-8"?>
-<p:sldLayout xmlns:a="http://schemas.openxmlformats.org/drawingml/2006/main" xmlns:p="http://schemas.openxmlformats.org/presentationml/2006/main" xmlns:r="http://schemas.openxmlformats.org/officeDocument/2006/relationships" type="tx" preserve="1">
+<p:sldLayout xmlns:a="http://schemas.openxmlformats.org/drawingml/2006/main" xmlns:r="http://schemas.openxmlformats.org/officeDocument/2006/relationships" xmlns:p="http://schemas.openxmlformats.org/presentationml/2006/main" type="tx" preserve="1">
   <p:cSld name="Title Slide">
     <p:spTree>
       <p:nvGrpSpPr>
@@ -970,7 +1124,8 @@
           </a:prstGeom>
         </p:spPr>
         <p:txBody>
-          <a:bodyPr lIns="0" rIns="0" tIns="0" bIns="0" anchor="ctr"/>
+          <a:bodyPr lIns="0" tIns="0" rIns="0" bIns="0" anchor="ctr"/>
+          <a:lstStyle/>
           <a:p>
             <a:endParaRPr/>
           </a:p>
@@ -996,7 +1151,8 @@
           </a:prstGeom>
         </p:spPr>
         <p:txBody>
-          <a:bodyPr lIns="0" rIns="0" tIns="0" bIns="0" anchor="ctr"/>
+          <a:bodyPr lIns="0" tIns="0" rIns="0" bIns="0" anchor="ctr"/>
+          <a:lstStyle/>
           <a:p>
             <a:pPr algn="ctr"/>
             <a:endParaRPr/>
@@ -1005,11 +1161,14 @@
       </p:sp>
     </p:spTree>
   </p:cSld>
+  <p:clrMapOvr>
+    <a:masterClrMapping/>
+  </p:clrMapOvr>
 </p:sldLayout>
 </file>
 
 <file path=ppt/slideLayouts/slideLayout20.xml><?xml version="1.0" encoding="utf-8"?>
-<p:sldLayout xmlns:a="http://schemas.openxmlformats.org/drawingml/2006/main" xmlns:p="http://schemas.openxmlformats.org/presentationml/2006/main" xmlns:r="http://schemas.openxmlformats.org/officeDocument/2006/relationships" type="objAndTwoObj" preserve="1">
+<p:sldLayout xmlns:a="http://schemas.openxmlformats.org/drawingml/2006/main" xmlns:r="http://schemas.openxmlformats.org/officeDocument/2006/relationships" xmlns:p="http://schemas.openxmlformats.org/presentationml/2006/main" type="objAndTwoObj" preserve="1">
   <p:cSld name="Title Content and 2 Content">
     <p:spTree>
       <p:nvGrpSpPr>
@@ -1045,7 +1204,8 @@
           </a:prstGeom>
         </p:spPr>
         <p:txBody>
-          <a:bodyPr lIns="0" rIns="0" tIns="0" bIns="0" anchor="ctr"/>
+          <a:bodyPr lIns="0" tIns="0" rIns="0" bIns="0" anchor="ctr"/>
+          <a:lstStyle/>
           <a:p>
             <a:endParaRPr/>
           </a:p>
@@ -1071,7 +1231,8 @@
           </a:prstGeom>
         </p:spPr>
         <p:txBody>
-          <a:bodyPr lIns="0" rIns="0" tIns="0" bIns="0"/>
+          <a:bodyPr lIns="0" tIns="0" rIns="0" bIns="0"/>
+          <a:lstStyle/>
           <a:p>
             <a:endParaRPr/>
           </a:p>
@@ -1097,7 +1258,8 @@
           </a:prstGeom>
         </p:spPr>
         <p:txBody>
-          <a:bodyPr lIns="0" rIns="0" tIns="0" bIns="0"/>
+          <a:bodyPr lIns="0" tIns="0" rIns="0" bIns="0"/>
+          <a:lstStyle/>
           <a:p>
             <a:endParaRPr/>
           </a:p>
@@ -1123,7 +1285,8 @@
           </a:prstGeom>
         </p:spPr>
         <p:txBody>
-          <a:bodyPr lIns="0" rIns="0" tIns="0" bIns="0"/>
+          <a:bodyPr lIns="0" tIns="0" rIns="0" bIns="0"/>
+          <a:lstStyle/>
           <a:p>
             <a:endParaRPr/>
           </a:p>
@@ -1131,11 +1294,14 @@
       </p:sp>
     </p:spTree>
   </p:cSld>
+  <p:clrMapOvr>
+    <a:masterClrMapping/>
+  </p:clrMapOvr>
 </p:sldLayout>
 </file>
 
 <file path=ppt/slideLayouts/slideLayout21.xml><?xml version="1.0" encoding="utf-8"?>
-<p:sldLayout xmlns:a="http://schemas.openxmlformats.org/drawingml/2006/main" xmlns:p="http://schemas.openxmlformats.org/presentationml/2006/main" xmlns:r="http://schemas.openxmlformats.org/officeDocument/2006/relationships" type="twoObjOverTx" preserve="1">
+<p:sldLayout xmlns:a="http://schemas.openxmlformats.org/drawingml/2006/main" xmlns:r="http://schemas.openxmlformats.org/officeDocument/2006/relationships" xmlns:p="http://schemas.openxmlformats.org/presentationml/2006/main" type="twoObjOverTx" preserve="1">
   <p:cSld name="Title, 2 Content over Content">
     <p:spTree>
       <p:nvGrpSpPr>
@@ -1171,7 +1337,8 @@
           </a:prstGeom>
         </p:spPr>
         <p:txBody>
-          <a:bodyPr lIns="0" rIns="0" tIns="0" bIns="0" anchor="ctr"/>
+          <a:bodyPr lIns="0" tIns="0" rIns="0" bIns="0" anchor="ctr"/>
+          <a:lstStyle/>
           <a:p>
             <a:endParaRPr/>
           </a:p>
@@ -1197,7 +1364,8 @@
           </a:prstGeom>
         </p:spPr>
         <p:txBody>
-          <a:bodyPr lIns="0" rIns="0" tIns="0" bIns="0"/>
+          <a:bodyPr lIns="0" tIns="0" rIns="0" bIns="0"/>
+          <a:lstStyle/>
           <a:p>
             <a:endParaRPr/>
           </a:p>
@@ -1223,7 +1391,8 @@
           </a:prstGeom>
         </p:spPr>
         <p:txBody>
-          <a:bodyPr lIns="0" rIns="0" tIns="0" bIns="0"/>
+          <a:bodyPr lIns="0" tIns="0" rIns="0" bIns="0"/>
+          <a:lstStyle/>
           <a:p>
             <a:endParaRPr/>
           </a:p>
@@ -1249,7 +1418,8 @@
           </a:prstGeom>
         </p:spPr>
         <p:txBody>
-          <a:bodyPr lIns="0" rIns="0" tIns="0" bIns="0"/>
+          <a:bodyPr lIns="0" tIns="0" rIns="0" bIns="0"/>
+          <a:lstStyle/>
           <a:p>
             <a:endParaRPr/>
           </a:p>
@@ -1257,11 +1427,14 @@
       </p:sp>
     </p:spTree>
   </p:cSld>
+  <p:clrMapOvr>
+    <a:masterClrMapping/>
+  </p:clrMapOvr>
 </p:sldLayout>
 </file>
 
 <file path=ppt/slideLayouts/slideLayout22.xml><?xml version="1.0" encoding="utf-8"?>
-<p:sldLayout xmlns:a="http://schemas.openxmlformats.org/drawingml/2006/main" xmlns:p="http://schemas.openxmlformats.org/presentationml/2006/main" xmlns:r="http://schemas.openxmlformats.org/officeDocument/2006/relationships" type="objOverTx" preserve="1">
+<p:sldLayout xmlns:a="http://schemas.openxmlformats.org/drawingml/2006/main" xmlns:r="http://schemas.openxmlformats.org/officeDocument/2006/relationships" xmlns:p="http://schemas.openxmlformats.org/presentationml/2006/main" type="objOverTx" preserve="1">
   <p:cSld name="Title, Content over Content">
     <p:spTree>
       <p:nvGrpSpPr>
@@ -1297,7 +1470,8 @@
           </a:prstGeom>
         </p:spPr>
         <p:txBody>
-          <a:bodyPr lIns="0" rIns="0" tIns="0" bIns="0" anchor="ctr"/>
+          <a:bodyPr lIns="0" tIns="0" rIns="0" bIns="0" anchor="ctr"/>
+          <a:lstStyle/>
           <a:p>
             <a:endParaRPr/>
           </a:p>
@@ -1323,7 +1497,8 @@
           </a:prstGeom>
         </p:spPr>
         <p:txBody>
-          <a:bodyPr lIns="0" rIns="0" tIns="0" bIns="0"/>
+          <a:bodyPr lIns="0" tIns="0" rIns="0" bIns="0"/>
+          <a:lstStyle/>
           <a:p>
             <a:endParaRPr/>
           </a:p>
@@ -1349,7 +1524,8 @@
           </a:prstGeom>
         </p:spPr>
         <p:txBody>
-          <a:bodyPr lIns="0" rIns="0" tIns="0" bIns="0"/>
+          <a:bodyPr lIns="0" tIns="0" rIns="0" bIns="0"/>
+          <a:lstStyle/>
           <a:p>
             <a:endParaRPr/>
           </a:p>
@@ -1357,11 +1533,14 @@
       </p:sp>
     </p:spTree>
   </p:cSld>
+  <p:clrMapOvr>
+    <a:masterClrMapping/>
+  </p:clrMapOvr>
 </p:sldLayout>
 </file>
 
 <file path=ppt/slideLayouts/slideLayout23.xml><?xml version="1.0" encoding="utf-8"?>
-<p:sldLayout xmlns:a="http://schemas.openxmlformats.org/drawingml/2006/main" xmlns:p="http://schemas.openxmlformats.org/presentationml/2006/main" xmlns:r="http://schemas.openxmlformats.org/officeDocument/2006/relationships" type="fourObj" preserve="1">
+<p:sldLayout xmlns:a="http://schemas.openxmlformats.org/drawingml/2006/main" xmlns:r="http://schemas.openxmlformats.org/officeDocument/2006/relationships" xmlns:p="http://schemas.openxmlformats.org/presentationml/2006/main" type="fourObj" preserve="1">
   <p:cSld name="Title, 4 Content">
     <p:spTree>
       <p:nvGrpSpPr>
@@ -1397,7 +1576,8 @@
           </a:prstGeom>
         </p:spPr>
         <p:txBody>
-          <a:bodyPr lIns="0" rIns="0" tIns="0" bIns="0" anchor="ctr"/>
+          <a:bodyPr lIns="0" tIns="0" rIns="0" bIns="0" anchor="ctr"/>
+          <a:lstStyle/>
           <a:p>
             <a:endParaRPr/>
           </a:p>
@@ -1423,7 +1603,8 @@
           </a:prstGeom>
         </p:spPr>
         <p:txBody>
-          <a:bodyPr lIns="0" rIns="0" tIns="0" bIns="0"/>
+          <a:bodyPr lIns="0" tIns="0" rIns="0" bIns="0"/>
+          <a:lstStyle/>
           <a:p>
             <a:endParaRPr/>
           </a:p>
@@ -1449,7 +1630,8 @@
           </a:prstGeom>
         </p:spPr>
         <p:txBody>
-          <a:bodyPr lIns="0" rIns="0" tIns="0" bIns="0"/>
+          <a:bodyPr lIns="0" tIns="0" rIns="0" bIns="0"/>
+          <a:lstStyle/>
           <a:p>
             <a:endParaRPr/>
           </a:p>
@@ -1475,7 +1657,8 @@
           </a:prstGeom>
         </p:spPr>
         <p:txBody>
-          <a:bodyPr lIns="0" rIns="0" tIns="0" bIns="0"/>
+          <a:bodyPr lIns="0" tIns="0" rIns="0" bIns="0"/>
+          <a:lstStyle/>
           <a:p>
             <a:endParaRPr/>
           </a:p>
@@ -1501,7 +1684,8 @@
           </a:prstGeom>
         </p:spPr>
         <p:txBody>
-          <a:bodyPr lIns="0" rIns="0" tIns="0" bIns="0"/>
+          <a:bodyPr lIns="0" tIns="0" rIns="0" bIns="0"/>
+          <a:lstStyle/>
           <a:p>
             <a:endParaRPr/>
           </a:p>
@@ -1509,11 +1693,14 @@
       </p:sp>
     </p:spTree>
   </p:cSld>
+  <p:clrMapOvr>
+    <a:masterClrMapping/>
+  </p:clrMapOvr>
 </p:sldLayout>
 </file>
 
 <file path=ppt/slideLayouts/slideLayout24.xml><?xml version="1.0" encoding="utf-8"?>
-<p:sldLayout xmlns:a="http://schemas.openxmlformats.org/drawingml/2006/main" xmlns:p="http://schemas.openxmlformats.org/presentationml/2006/main" xmlns:r="http://schemas.openxmlformats.org/officeDocument/2006/relationships" type="blank" preserve="1">
+<p:sldLayout xmlns:a="http://schemas.openxmlformats.org/drawingml/2006/main" xmlns:r="http://schemas.openxmlformats.org/officeDocument/2006/relationships" xmlns:p="http://schemas.openxmlformats.org/presentationml/2006/main" type="blank" preserve="1">
   <p:cSld name="Title, 6 Content">
     <p:spTree>
       <p:nvGrpSpPr>
@@ -1549,7 +1736,8 @@
           </a:prstGeom>
         </p:spPr>
         <p:txBody>
-          <a:bodyPr lIns="0" rIns="0" tIns="0" bIns="0" anchor="ctr"/>
+          <a:bodyPr lIns="0" tIns="0" rIns="0" bIns="0" anchor="ctr"/>
+          <a:lstStyle/>
           <a:p>
             <a:endParaRPr/>
           </a:p>
@@ -1575,7 +1763,8 @@
           </a:prstGeom>
         </p:spPr>
         <p:txBody>
-          <a:bodyPr lIns="0" rIns="0" tIns="0" bIns="0"/>
+          <a:bodyPr lIns="0" tIns="0" rIns="0" bIns="0"/>
+          <a:lstStyle/>
           <a:p>
             <a:endParaRPr/>
           </a:p>
@@ -1601,7 +1790,8 @@
           </a:prstGeom>
         </p:spPr>
         <p:txBody>
-          <a:bodyPr lIns="0" rIns="0" tIns="0" bIns="0"/>
+          <a:bodyPr lIns="0" tIns="0" rIns="0" bIns="0"/>
+          <a:lstStyle/>
           <a:p>
             <a:endParaRPr/>
           </a:p>
@@ -1609,7 +1799,7 @@
       </p:sp>
       <p:pic>
         <p:nvPicPr>
-          <p:cNvPr id="76" name="" descr=""/>
+          <p:cNvPr id="76" name="Picture 75"/>
           <p:cNvPicPr/>
           <p:nvPr/>
         </p:nvPicPr>
@@ -1632,12 +1822,12 @@
       </p:pic>
       <p:pic>
         <p:nvPicPr>
-          <p:cNvPr id="77" name="" descr=""/>
+          <p:cNvPr id="77" name="Picture 76"/>
           <p:cNvPicPr/>
           <p:nvPr/>
         </p:nvPicPr>
         <p:blipFill>
-          <a:blip r:embed="rId3"/>
+          <a:blip r:embed="rId2"/>
           <a:stretch/>
         </p:blipFill>
         <p:spPr>
@@ -1655,11 +1845,14 @@
       </p:pic>
     </p:spTree>
   </p:cSld>
+  <p:clrMapOvr>
+    <a:masterClrMapping/>
+  </p:clrMapOvr>
 </p:sldLayout>
 </file>
 
 <file path=ppt/slideLayouts/slideLayout3.xml><?xml version="1.0" encoding="utf-8"?>
-<p:sldLayout xmlns:a="http://schemas.openxmlformats.org/drawingml/2006/main" xmlns:p="http://schemas.openxmlformats.org/presentationml/2006/main" xmlns:r="http://schemas.openxmlformats.org/officeDocument/2006/relationships" type="obj" preserve="1">
+<p:sldLayout xmlns:a="http://schemas.openxmlformats.org/drawingml/2006/main" xmlns:r="http://schemas.openxmlformats.org/officeDocument/2006/relationships" xmlns:p="http://schemas.openxmlformats.org/presentationml/2006/main" type="obj" preserve="1">
   <p:cSld name="Title, Content">
     <p:spTree>
       <p:nvGrpSpPr>
@@ -1695,7 +1888,8 @@
           </a:prstGeom>
         </p:spPr>
         <p:txBody>
-          <a:bodyPr lIns="0" rIns="0" tIns="0" bIns="0" anchor="ctr"/>
+          <a:bodyPr lIns="0" tIns="0" rIns="0" bIns="0" anchor="ctr"/>
+          <a:lstStyle/>
           <a:p>
             <a:endParaRPr/>
           </a:p>
@@ -1721,7 +1915,8 @@
           </a:prstGeom>
         </p:spPr>
         <p:txBody>
-          <a:bodyPr lIns="0" rIns="0" tIns="0" bIns="0"/>
+          <a:bodyPr lIns="0" tIns="0" rIns="0" bIns="0"/>
+          <a:lstStyle/>
           <a:p>
             <a:endParaRPr/>
           </a:p>
@@ -1729,11 +1924,14 @@
       </p:sp>
     </p:spTree>
   </p:cSld>
+  <p:clrMapOvr>
+    <a:masterClrMapping/>
+  </p:clrMapOvr>
 </p:sldLayout>
 </file>
 
 <file path=ppt/slideLayouts/slideLayout4.xml><?xml version="1.0" encoding="utf-8"?>
-<p:sldLayout xmlns:a="http://schemas.openxmlformats.org/drawingml/2006/main" xmlns:p="http://schemas.openxmlformats.org/presentationml/2006/main" xmlns:r="http://schemas.openxmlformats.org/officeDocument/2006/relationships" type="twoObj" preserve="1">
+<p:sldLayout xmlns:a="http://schemas.openxmlformats.org/drawingml/2006/main" xmlns:r="http://schemas.openxmlformats.org/officeDocument/2006/relationships" xmlns:p="http://schemas.openxmlformats.org/presentationml/2006/main" type="twoObj" preserve="1">
   <p:cSld name="Title, 2 Content">
     <p:spTree>
       <p:nvGrpSpPr>
@@ -1769,7 +1967,8 @@
           </a:prstGeom>
         </p:spPr>
         <p:txBody>
-          <a:bodyPr lIns="0" rIns="0" tIns="0" bIns="0" anchor="ctr"/>
+          <a:bodyPr lIns="0" tIns="0" rIns="0" bIns="0" anchor="ctr"/>
+          <a:lstStyle/>
           <a:p>
             <a:endParaRPr/>
           </a:p>
@@ -1795,7 +1994,8 @@
           </a:prstGeom>
         </p:spPr>
         <p:txBody>
-          <a:bodyPr lIns="0" rIns="0" tIns="0" bIns="0"/>
+          <a:bodyPr lIns="0" tIns="0" rIns="0" bIns="0"/>
+          <a:lstStyle/>
           <a:p>
             <a:endParaRPr/>
           </a:p>
@@ -1821,7 +2021,8 @@
           </a:prstGeom>
         </p:spPr>
         <p:txBody>
-          <a:bodyPr lIns="0" rIns="0" tIns="0" bIns="0"/>
+          <a:bodyPr lIns="0" tIns="0" rIns="0" bIns="0"/>
+          <a:lstStyle/>
           <a:p>
             <a:endParaRPr/>
           </a:p>
@@ -1829,11 +2030,14 @@
       </p:sp>
     </p:spTree>
   </p:cSld>
+  <p:clrMapOvr>
+    <a:masterClrMapping/>
+  </p:clrMapOvr>
 </p:sldLayout>
 </file>
 
 <file path=ppt/slideLayouts/slideLayout5.xml><?xml version="1.0" encoding="utf-8"?>
-<p:sldLayout xmlns:a="http://schemas.openxmlformats.org/drawingml/2006/main" xmlns:p="http://schemas.openxmlformats.org/presentationml/2006/main" xmlns:r="http://schemas.openxmlformats.org/officeDocument/2006/relationships" type="titleOnly" preserve="1">
+<p:sldLayout xmlns:a="http://schemas.openxmlformats.org/drawingml/2006/main" xmlns:r="http://schemas.openxmlformats.org/officeDocument/2006/relationships" xmlns:p="http://schemas.openxmlformats.org/presentationml/2006/main" type="titleOnly" preserve="1">
   <p:cSld name="Title Only">
     <p:spTree>
       <p:nvGrpSpPr>
@@ -1869,7 +2073,8 @@
           </a:prstGeom>
         </p:spPr>
         <p:txBody>
-          <a:bodyPr lIns="0" rIns="0" tIns="0" bIns="0" anchor="ctr"/>
+          <a:bodyPr lIns="0" tIns="0" rIns="0" bIns="0" anchor="ctr"/>
+          <a:lstStyle/>
           <a:p>
             <a:endParaRPr/>
           </a:p>
@@ -1877,11 +2082,14 @@
       </p:sp>
     </p:spTree>
   </p:cSld>
+  <p:clrMapOvr>
+    <a:masterClrMapping/>
+  </p:clrMapOvr>
 </p:sldLayout>
 </file>
 
 <file path=ppt/slideLayouts/slideLayout6.xml><?xml version="1.0" encoding="utf-8"?>
-<p:sldLayout xmlns:a="http://schemas.openxmlformats.org/drawingml/2006/main" xmlns:p="http://schemas.openxmlformats.org/presentationml/2006/main" xmlns:r="http://schemas.openxmlformats.org/officeDocument/2006/relationships" type="objOnly" preserve="1">
+<p:sldLayout xmlns:a="http://schemas.openxmlformats.org/drawingml/2006/main" xmlns:r="http://schemas.openxmlformats.org/officeDocument/2006/relationships" xmlns:p="http://schemas.openxmlformats.org/presentationml/2006/main" type="objOnly" preserve="1">
   <p:cSld name="Centered Text">
     <p:spTree>
       <p:nvGrpSpPr>
@@ -1917,7 +2125,8 @@
           </a:prstGeom>
         </p:spPr>
         <p:txBody>
-          <a:bodyPr lIns="0" rIns="0" tIns="0" bIns="0" anchor="ctr"/>
+          <a:bodyPr lIns="0" tIns="0" rIns="0" bIns="0" anchor="ctr"/>
+          <a:lstStyle/>
           <a:p>
             <a:pPr algn="ctr"/>
             <a:endParaRPr/>
@@ -1926,11 +2135,14 @@
       </p:sp>
     </p:spTree>
   </p:cSld>
+  <p:clrMapOvr>
+    <a:masterClrMapping/>
+  </p:clrMapOvr>
 </p:sldLayout>
 </file>
 
 <file path=ppt/slideLayouts/slideLayout7.xml><?xml version="1.0" encoding="utf-8"?>
-<p:sldLayout xmlns:a="http://schemas.openxmlformats.org/drawingml/2006/main" xmlns:p="http://schemas.openxmlformats.org/presentationml/2006/main" xmlns:r="http://schemas.openxmlformats.org/officeDocument/2006/relationships" type="twoObjAndObj" preserve="1">
+<p:sldLayout xmlns:a="http://schemas.openxmlformats.org/drawingml/2006/main" xmlns:r="http://schemas.openxmlformats.org/officeDocument/2006/relationships" xmlns:p="http://schemas.openxmlformats.org/presentationml/2006/main" type="twoObjAndObj" preserve="1">
   <p:cSld name="Title, 2 Content and Content">
     <p:spTree>
       <p:nvGrpSpPr>
@@ -1966,7 +2178,8 @@
           </a:prstGeom>
         </p:spPr>
         <p:txBody>
-          <a:bodyPr lIns="0" rIns="0" tIns="0" bIns="0" anchor="ctr"/>
+          <a:bodyPr lIns="0" tIns="0" rIns="0" bIns="0" anchor="ctr"/>
+          <a:lstStyle/>
           <a:p>
             <a:endParaRPr/>
           </a:p>
@@ -1992,7 +2205,8 @@
           </a:prstGeom>
         </p:spPr>
         <p:txBody>
-          <a:bodyPr lIns="0" rIns="0" tIns="0" bIns="0"/>
+          <a:bodyPr lIns="0" tIns="0" rIns="0" bIns="0"/>
+          <a:lstStyle/>
           <a:p>
             <a:endParaRPr/>
           </a:p>
@@ -2018,7 +2232,8 @@
           </a:prstGeom>
         </p:spPr>
         <p:txBody>
-          <a:bodyPr lIns="0" rIns="0" tIns="0" bIns="0"/>
+          <a:bodyPr lIns="0" tIns="0" rIns="0" bIns="0"/>
+          <a:lstStyle/>
           <a:p>
             <a:endParaRPr/>
           </a:p>
@@ -2044,7 +2259,8 @@
           </a:prstGeom>
         </p:spPr>
         <p:txBody>
-          <a:bodyPr lIns="0" rIns="0" tIns="0" bIns="0"/>
+          <a:bodyPr lIns="0" tIns="0" rIns="0" bIns="0"/>
+          <a:lstStyle/>
           <a:p>
             <a:endParaRPr/>
           </a:p>
@@ -2052,11 +2268,14 @@
       </p:sp>
     </p:spTree>
   </p:cSld>
+  <p:clrMapOvr>
+    <a:masterClrMapping/>
+  </p:clrMapOvr>
 </p:sldLayout>
 </file>
 
 <file path=ppt/slideLayouts/slideLayout8.xml><?xml version="1.0" encoding="utf-8"?>
-<p:sldLayout xmlns:a="http://schemas.openxmlformats.org/drawingml/2006/main" xmlns:p="http://schemas.openxmlformats.org/presentationml/2006/main" xmlns:r="http://schemas.openxmlformats.org/officeDocument/2006/relationships" type="objAndTwoObj" preserve="1">
+<p:sldLayout xmlns:a="http://schemas.openxmlformats.org/drawingml/2006/main" xmlns:r="http://schemas.openxmlformats.org/officeDocument/2006/relationships" xmlns:p="http://schemas.openxmlformats.org/presentationml/2006/main" type="objAndTwoObj" preserve="1">
   <p:cSld name="Title Content and 2 Content">
     <p:spTree>
       <p:nvGrpSpPr>
@@ -2092,7 +2311,8 @@
           </a:prstGeom>
         </p:spPr>
         <p:txBody>
-          <a:bodyPr lIns="0" rIns="0" tIns="0" bIns="0" anchor="ctr"/>
+          <a:bodyPr lIns="0" tIns="0" rIns="0" bIns="0" anchor="ctr"/>
+          <a:lstStyle/>
           <a:p>
             <a:endParaRPr/>
           </a:p>
@@ -2118,7 +2338,8 @@
           </a:prstGeom>
         </p:spPr>
         <p:txBody>
-          <a:bodyPr lIns="0" rIns="0" tIns="0" bIns="0"/>
+          <a:bodyPr lIns="0" tIns="0" rIns="0" bIns="0"/>
+          <a:lstStyle/>
           <a:p>
             <a:endParaRPr/>
           </a:p>
@@ -2144,7 +2365,8 @@
           </a:prstGeom>
         </p:spPr>
         <p:txBody>
-          <a:bodyPr lIns="0" rIns="0" tIns="0" bIns="0"/>
+          <a:bodyPr lIns="0" tIns="0" rIns="0" bIns="0"/>
+          <a:lstStyle/>
           <a:p>
             <a:endParaRPr/>
           </a:p>
@@ -2170,7 +2392,8 @@
           </a:prstGeom>
         </p:spPr>
         <p:txBody>
-          <a:bodyPr lIns="0" rIns="0" tIns="0" bIns="0"/>
+          <a:bodyPr lIns="0" tIns="0" rIns="0" bIns="0"/>
+          <a:lstStyle/>
           <a:p>
             <a:endParaRPr/>
           </a:p>
@@ -2178,11 +2401,14 @@
       </p:sp>
     </p:spTree>
   </p:cSld>
+  <p:clrMapOvr>
+    <a:masterClrMapping/>
+  </p:clrMapOvr>
 </p:sldLayout>
 </file>
 
 <file path=ppt/slideLayouts/slideLayout9.xml><?xml version="1.0" encoding="utf-8"?>
-<p:sldLayout xmlns:a="http://schemas.openxmlformats.org/drawingml/2006/main" xmlns:p="http://schemas.openxmlformats.org/presentationml/2006/main" xmlns:r="http://schemas.openxmlformats.org/officeDocument/2006/relationships" type="twoObjOverTx" preserve="1">
+<p:sldLayout xmlns:a="http://schemas.openxmlformats.org/drawingml/2006/main" xmlns:r="http://schemas.openxmlformats.org/officeDocument/2006/relationships" xmlns:p="http://schemas.openxmlformats.org/presentationml/2006/main" type="twoObjOverTx" preserve="1">
   <p:cSld name="Title, 2 Content over Content">
     <p:spTree>
       <p:nvGrpSpPr>
@@ -2218,7 +2444,8 @@
           </a:prstGeom>
         </p:spPr>
         <p:txBody>
-          <a:bodyPr lIns="0" rIns="0" tIns="0" bIns="0" anchor="ctr"/>
+          <a:bodyPr lIns="0" tIns="0" rIns="0" bIns="0" anchor="ctr"/>
+          <a:lstStyle/>
           <a:p>
             <a:endParaRPr/>
           </a:p>
@@ -2244,7 +2471,8 @@
           </a:prstGeom>
         </p:spPr>
         <p:txBody>
-          <a:bodyPr lIns="0" rIns="0" tIns="0" bIns="0"/>
+          <a:bodyPr lIns="0" tIns="0" rIns="0" bIns="0"/>
+          <a:lstStyle/>
           <a:p>
             <a:endParaRPr/>
           </a:p>
@@ -2270,7 +2498,8 @@
           </a:prstGeom>
         </p:spPr>
         <p:txBody>
-          <a:bodyPr lIns="0" rIns="0" tIns="0" bIns="0"/>
+          <a:bodyPr lIns="0" tIns="0" rIns="0" bIns="0"/>
+          <a:lstStyle/>
           <a:p>
             <a:endParaRPr/>
           </a:p>
@@ -2296,7 +2525,8 @@
           </a:prstGeom>
         </p:spPr>
         <p:txBody>
-          <a:bodyPr lIns="0" rIns="0" tIns="0" bIns="0"/>
+          <a:bodyPr lIns="0" tIns="0" rIns="0" bIns="0"/>
+          <a:lstStyle/>
           <a:p>
             <a:endParaRPr/>
           </a:p>
@@ -2304,17 +2534,21 @@
       </p:sp>
     </p:spTree>
   </p:cSld>
+  <p:clrMapOvr>
+    <a:masterClrMapping/>
+  </p:clrMapOvr>
 </p:sldLayout>
 </file>
 
 <file path=ppt/slideMasters/slideMaster1.xml><?xml version="1.0" encoding="utf-8"?>
-<p:sldMaster xmlns:a="http://schemas.openxmlformats.org/drawingml/2006/main" xmlns:p="http://schemas.openxmlformats.org/presentationml/2006/main" xmlns:r="http://schemas.openxmlformats.org/officeDocument/2006/relationships">
+<p:sldMaster xmlns:a="http://schemas.openxmlformats.org/drawingml/2006/main" xmlns:r="http://schemas.openxmlformats.org/officeDocument/2006/relationships" xmlns:p="http://schemas.openxmlformats.org/presentationml/2006/main">
   <p:cSld>
     <p:bg>
       <p:bgPr>
         <a:solidFill>
           <a:srgbClr val="000000"/>
         </a:solidFill>
+        <a:effectLst/>
       </p:bgPr>
     </p:bg>
     <p:spTree>
@@ -2333,7 +2567,7 @@
       </p:grpSpPr>
       <p:sp>
         <p:nvSpPr>
-          <p:cNvPr id="0" name="PlaceHolder 1"/>
+          <p:cNvPr id="5" name="PlaceHolder 1"/>
           <p:cNvSpPr>
             <a:spLocks noGrp="1"/>
           </p:cNvSpPr>
@@ -2352,6 +2586,7 @@
         </p:spPr>
         <p:txBody>
           <a:bodyPr anchor="ctr"/>
+          <a:lstStyle/>
           <a:p>
             <a:pPr algn="ctr">
               <a:lnSpc>
@@ -2361,7 +2596,7 @@
             <a:r>
               <a:rPr lang="en-US" sz="4400" strike="noStrike">
                 <a:solidFill>
-                  <a:srgbClr val="ffffff"/>
+                  <a:srgbClr val="FFFFFF"/>
                 </a:solidFill>
                 <a:latin typeface="Calibri"/>
               </a:rPr>
@@ -2373,7 +2608,7 @@
       </p:sp>
       <p:sp>
         <p:nvSpPr>
-          <p:cNvPr id="1" name="PlaceHolder 2"/>
+          <p:cNvPr id="6" name="PlaceHolder 2"/>
           <p:cNvSpPr>
             <a:spLocks noGrp="1"/>
           </p:cNvSpPr>
@@ -2392,6 +2627,7 @@
         </p:spPr>
         <p:txBody>
           <a:bodyPr anchor="ctr"/>
+          <a:lstStyle/>
           <a:p>
             <a:pPr>
               <a:lnSpc>
@@ -2401,7 +2637,7 @@
             <a:r>
               <a:rPr lang="en-US" sz="1200" strike="noStrike">
                 <a:solidFill>
-                  <a:srgbClr val="ffffff"/>
+                  <a:srgbClr val="FFFFFF"/>
                 </a:solidFill>
                 <a:latin typeface="Calibri"/>
               </a:rPr>
@@ -2432,6 +2668,7 @@
         </p:spPr>
         <p:txBody>
           <a:bodyPr anchor="ctr"/>
+          <a:lstStyle/>
           <a:p>
             <a:endParaRPr/>
           </a:p>
@@ -2458,6 +2695,7 @@
         </p:spPr>
         <p:txBody>
           <a:bodyPr anchor="ctr"/>
+          <a:lstStyle/>
           <a:p>
             <a:pPr algn="r">
               <a:lnSpc>
@@ -2467,11 +2705,11 @@
             <a:fld id="{BB422FC2-35F6-4C06-825D-58E16CAD5A39}" type="slidenum">
               <a:rPr lang="en-US" sz="1200" strike="noStrike">
                 <a:solidFill>
-                  <a:srgbClr val="ffffff"/>
+                  <a:srgbClr val="FFFFFF"/>
                 </a:solidFill>
                 <a:latin typeface="Calibri"/>
               </a:rPr>
-              <a:t>&lt;number&gt;</a:t>
+              <a:t>‹#›</a:t>
             </a:fld>
             <a:endParaRPr/>
           </a:p>
@@ -2497,7 +2735,8 @@
           </a:prstGeom>
         </p:spPr>
         <p:txBody>
-          <a:bodyPr lIns="0" rIns="0" tIns="0" bIns="0"/>
+          <a:bodyPr lIns="0" tIns="0" rIns="0" bIns="0"/>
+          <a:lstStyle/>
           <a:p>
             <a:pPr>
               <a:buSzPct val="45000"/>
@@ -2600,32 +2839,38 @@
       </p:sp>
     </p:spTree>
   </p:cSld>
-  <p:clrMap bg1="lt1" bg2="lt2" tx1="dk1" tx2="dk2" accent1="accent1" accent2="accent2" accent3="accent3" accent4="accent4" accent5="accent5" accent6="accent6" hlink="hlink" folHlink="folHlink"/>
+  <p:clrMap bg1="lt1" tx1="dk1" bg2="lt2" tx2="dk2" accent1="accent1" accent2="accent2" accent3="accent3" accent4="accent4" accent5="accent5" accent6="accent6" hlink="hlink" folHlink="folHlink"/>
   <p:sldLayoutIdLst>
-    <p:sldLayoutId id="2147483649" r:id="rId2"/>
-    <p:sldLayoutId id="2147483650" r:id="rId3"/>
-    <p:sldLayoutId id="2147483651" r:id="rId4"/>
-    <p:sldLayoutId id="2147483652" r:id="rId5"/>
-    <p:sldLayoutId id="2147483653" r:id="rId6"/>
-    <p:sldLayoutId id="2147483654" r:id="rId7"/>
-    <p:sldLayoutId id="2147483655" r:id="rId8"/>
-    <p:sldLayoutId id="2147483656" r:id="rId9"/>
-    <p:sldLayoutId id="2147483657" r:id="rId10"/>
-    <p:sldLayoutId id="2147483658" r:id="rId11"/>
-    <p:sldLayoutId id="2147483659" r:id="rId12"/>
-    <p:sldLayoutId id="2147483660" r:id="rId13"/>
+    <p:sldLayoutId id="2147483649" r:id="rId1"/>
+    <p:sldLayoutId id="2147483650" r:id="rId2"/>
+    <p:sldLayoutId id="2147483651" r:id="rId3"/>
+    <p:sldLayoutId id="2147483652" r:id="rId4"/>
+    <p:sldLayoutId id="2147483653" r:id="rId5"/>
+    <p:sldLayoutId id="2147483654" r:id="rId6"/>
+    <p:sldLayoutId id="2147483655" r:id="rId7"/>
+    <p:sldLayoutId id="2147483656" r:id="rId8"/>
+    <p:sldLayoutId id="2147483657" r:id="rId9"/>
+    <p:sldLayoutId id="2147483658" r:id="rId10"/>
+    <p:sldLayoutId id="2147483659" r:id="rId11"/>
+    <p:sldLayoutId id="2147483660" r:id="rId12"/>
   </p:sldLayoutIdLst>
+  <p:txStyles>
+    <p:titleStyle/>
+    <p:bodyStyle/>
+    <p:otherStyle/>
+  </p:txStyles>
 </p:sldMaster>
 </file>
 
 <file path=ppt/slideMasters/slideMaster2.xml><?xml version="1.0" encoding="utf-8"?>
-<p:sldMaster xmlns:a="http://schemas.openxmlformats.org/drawingml/2006/main" xmlns:p="http://schemas.openxmlformats.org/presentationml/2006/main" xmlns:r="http://schemas.openxmlformats.org/officeDocument/2006/relationships">
+<p:sldMaster xmlns:a="http://schemas.openxmlformats.org/drawingml/2006/main" xmlns:r="http://schemas.openxmlformats.org/officeDocument/2006/relationships" xmlns:p="http://schemas.openxmlformats.org/presentationml/2006/main">
   <p:cSld>
     <p:bg>
       <p:bgPr>
         <a:solidFill>
           <a:srgbClr val="000000"/>
         </a:solidFill>
+        <a:effectLst/>
       </p:bgPr>
     </p:bg>
     <p:spTree>
@@ -2663,6 +2908,7 @@
         </p:spPr>
         <p:txBody>
           <a:bodyPr anchor="ctr"/>
+          <a:lstStyle/>
           <a:p>
             <a:pPr algn="ctr">
               <a:lnSpc>
@@ -2672,7 +2918,7 @@
             <a:r>
               <a:rPr lang="en-US" sz="4400" strike="noStrike">
                 <a:solidFill>
-                  <a:srgbClr val="ffffff"/>
+                  <a:srgbClr val="FFFFFF"/>
                 </a:solidFill>
                 <a:latin typeface="Calibri"/>
               </a:rPr>
@@ -2703,6 +2949,7 @@
         </p:spPr>
         <p:txBody>
           <a:bodyPr/>
+          <a:lstStyle/>
           <a:p>
             <a:pPr>
               <a:buSzPct val="45000"/>
@@ -2712,7 +2959,7 @@
             <a:r>
               <a:rPr lang="en-US" sz="3200" strike="noStrike">
                 <a:solidFill>
-                  <a:srgbClr val="ffffff"/>
+                  <a:srgbClr val="FFFFFF"/>
                 </a:solidFill>
                 <a:latin typeface="Calibri"/>
               </a:rPr>
@@ -2729,7 +2976,7 @@
             <a:r>
               <a:rPr lang="en-US" sz="3200" strike="noStrike">
                 <a:solidFill>
-                  <a:srgbClr val="ffffff"/>
+                  <a:srgbClr val="FFFFFF"/>
                 </a:solidFill>
                 <a:latin typeface="Calibri"/>
               </a:rPr>
@@ -2746,7 +2993,7 @@
             <a:r>
               <a:rPr lang="en-US" sz="3200" strike="noStrike">
                 <a:solidFill>
-                  <a:srgbClr val="ffffff"/>
+                  <a:srgbClr val="FFFFFF"/>
                 </a:solidFill>
                 <a:latin typeface="Calibri"/>
               </a:rPr>
@@ -2763,7 +3010,7 @@
             <a:r>
               <a:rPr lang="en-US" sz="3200" strike="noStrike">
                 <a:solidFill>
-                  <a:srgbClr val="ffffff"/>
+                  <a:srgbClr val="FFFFFF"/>
                 </a:solidFill>
                 <a:latin typeface="Calibri"/>
               </a:rPr>
@@ -2780,7 +3027,7 @@
             <a:r>
               <a:rPr lang="en-US" sz="3200" strike="noStrike">
                 <a:solidFill>
-                  <a:srgbClr val="ffffff"/>
+                  <a:srgbClr val="FFFFFF"/>
                 </a:solidFill>
                 <a:latin typeface="Calibri"/>
               </a:rPr>
@@ -2797,7 +3044,7 @@
             <a:r>
               <a:rPr lang="en-US" sz="3200" strike="noStrike">
                 <a:solidFill>
-                  <a:srgbClr val="ffffff"/>
+                  <a:srgbClr val="FFFFFF"/>
                 </a:solidFill>
                 <a:latin typeface="Calibri"/>
               </a:rPr>
@@ -2816,7 +3063,7 @@
             <a:r>
               <a:rPr lang="en-US" sz="3200" strike="noStrike">
                 <a:solidFill>
-                  <a:srgbClr val="ffffff"/>
+                  <a:srgbClr val="FFFFFF"/>
                 </a:solidFill>
                 <a:latin typeface="Calibri"/>
               </a:rPr>
@@ -2835,7 +3082,7 @@
             <a:r>
               <a:rPr lang="en-US" sz="2800" strike="noStrike">
                 <a:solidFill>
-                  <a:srgbClr val="ffffff"/>
+                  <a:srgbClr val="FFFFFF"/>
                 </a:solidFill>
                 <a:latin typeface="Calibri"/>
               </a:rPr>
@@ -2854,7 +3101,7 @@
             <a:r>
               <a:rPr lang="en-US" sz="2400" strike="noStrike">
                 <a:solidFill>
-                  <a:srgbClr val="ffffff"/>
+                  <a:srgbClr val="FFFFFF"/>
                 </a:solidFill>
                 <a:latin typeface="Calibri"/>
               </a:rPr>
@@ -2873,7 +3120,7 @@
             <a:r>
               <a:rPr lang="en-US" sz="2000" strike="noStrike">
                 <a:solidFill>
-                  <a:srgbClr val="ffffff"/>
+                  <a:srgbClr val="FFFFFF"/>
                 </a:solidFill>
                 <a:latin typeface="Calibri"/>
               </a:rPr>
@@ -2892,7 +3139,7 @@
             <a:r>
               <a:rPr lang="en-US" sz="2000" strike="noStrike">
                 <a:solidFill>
-                  <a:srgbClr val="ffffff"/>
+                  <a:srgbClr val="FFFFFF"/>
                 </a:solidFill>
                 <a:latin typeface="Calibri"/>
               </a:rPr>
@@ -2923,6 +3170,7 @@
         </p:spPr>
         <p:txBody>
           <a:bodyPr anchor="ctr"/>
+          <a:lstStyle/>
           <a:p>
             <a:pPr>
               <a:lnSpc>
@@ -2932,7 +3180,7 @@
             <a:r>
               <a:rPr lang="en-US" sz="1200" strike="noStrike">
                 <a:solidFill>
-                  <a:srgbClr val="ffffff"/>
+                  <a:srgbClr val="FFFFFF"/>
                 </a:solidFill>
                 <a:latin typeface="Calibri"/>
               </a:rPr>
@@ -2963,6 +3211,7 @@
         </p:spPr>
         <p:txBody>
           <a:bodyPr anchor="ctr"/>
+          <a:lstStyle/>
           <a:p>
             <a:endParaRPr/>
           </a:p>
@@ -2989,6 +3238,7 @@
         </p:spPr>
         <p:txBody>
           <a:bodyPr anchor="ctr"/>
+          <a:lstStyle/>
           <a:p>
             <a:pPr algn="r">
               <a:lnSpc>
@@ -2998,11 +3248,11 @@
             <a:fld id="{D8DA36EB-EA61-474A-992D-0004A879E50E}" type="slidenum">
               <a:rPr lang="en-US" sz="1200" strike="noStrike">
                 <a:solidFill>
-                  <a:srgbClr val="ffffff"/>
+                  <a:srgbClr val="FFFFFF"/>
                 </a:solidFill>
                 <a:latin typeface="Calibri"/>
               </a:rPr>
-              <a:t>&lt;number&gt;</a:t>
+              <a:t>‹#›</a:t>
             </a:fld>
             <a:endParaRPr/>
           </a:p>
@@ -3010,26 +3260,31 @@
       </p:sp>
     </p:spTree>
   </p:cSld>
-  <p:clrMap bg1="lt1" bg2="lt2" tx1="dk1" tx2="dk2" accent1="accent1" accent2="accent2" accent3="accent3" accent4="accent4" accent5="accent5" accent6="accent6" hlink="hlink" folHlink="folHlink"/>
+  <p:clrMap bg1="lt1" tx1="dk1" bg2="lt2" tx2="dk2" accent1="accent1" accent2="accent2" accent3="accent3" accent4="accent4" accent5="accent5" accent6="accent6" hlink="hlink" folHlink="folHlink"/>
   <p:sldLayoutIdLst>
-    <p:sldLayoutId id="2147483662" r:id="rId2"/>
-    <p:sldLayoutId id="2147483663" r:id="rId3"/>
-    <p:sldLayoutId id="2147483664" r:id="rId4"/>
-    <p:sldLayoutId id="2147483665" r:id="rId5"/>
-    <p:sldLayoutId id="2147483666" r:id="rId6"/>
-    <p:sldLayoutId id="2147483667" r:id="rId7"/>
-    <p:sldLayoutId id="2147483668" r:id="rId8"/>
-    <p:sldLayoutId id="2147483669" r:id="rId9"/>
-    <p:sldLayoutId id="2147483670" r:id="rId10"/>
-    <p:sldLayoutId id="2147483671" r:id="rId11"/>
-    <p:sldLayoutId id="2147483672" r:id="rId12"/>
-    <p:sldLayoutId id="2147483673" r:id="rId13"/>
+    <p:sldLayoutId id="2147483662" r:id="rId1"/>
+    <p:sldLayoutId id="2147483663" r:id="rId2"/>
+    <p:sldLayoutId id="2147483664" r:id="rId3"/>
+    <p:sldLayoutId id="2147483665" r:id="rId4"/>
+    <p:sldLayoutId id="2147483666" r:id="rId5"/>
+    <p:sldLayoutId id="2147483667" r:id="rId6"/>
+    <p:sldLayoutId id="2147483668" r:id="rId7"/>
+    <p:sldLayoutId id="2147483669" r:id="rId8"/>
+    <p:sldLayoutId id="2147483670" r:id="rId9"/>
+    <p:sldLayoutId id="2147483671" r:id="rId10"/>
+    <p:sldLayoutId id="2147483672" r:id="rId11"/>
+    <p:sldLayoutId id="2147483673" r:id="rId12"/>
   </p:sldLayoutIdLst>
+  <p:txStyles>
+    <p:titleStyle/>
+    <p:bodyStyle/>
+    <p:otherStyle/>
+  </p:txStyles>
 </p:sldMaster>
 </file>
 
 <file path=ppt/slides/slide1.xml><?xml version="1.0" encoding="utf-8"?>
-<p:sld xmlns:a="http://schemas.openxmlformats.org/drawingml/2006/main" xmlns:p="http://schemas.openxmlformats.org/presentationml/2006/main" xmlns:r="http://schemas.openxmlformats.org/officeDocument/2006/relationships">
+<p:sld xmlns:a="http://schemas.openxmlformats.org/drawingml/2006/main" xmlns:r="http://schemas.openxmlformats.org/officeDocument/2006/relationships" xmlns:p="http://schemas.openxmlformats.org/presentationml/2006/main">
   <p:cSld>
     <p:spTree>
       <p:nvGrpSpPr>
@@ -3047,12 +3302,12 @@
       </p:grpSpPr>
       <p:pic>
         <p:nvPicPr>
-          <p:cNvPr id="78" name="Picture 3" descr=""/>
+          <p:cNvPr id="78" name="Picture 3"/>
           <p:cNvPicPr/>
           <p:nvPr/>
         </p:nvPicPr>
         <p:blipFill>
-          <a:blip r:embed="rId1"/>
+          <a:blip r:embed="rId2"/>
           <a:stretch/>
         </p:blipFill>
         <p:spPr>
@@ -3088,13 +3343,20 @@
           </a:ln>
         </p:spPr>
         <p:style>
-          <a:lnRef idx="0"/>
-          <a:fillRef idx="0"/>
-          <a:effectRef idx="0"/>
+          <a:lnRef idx="0">
+            <a:scrgbClr r="0" g="0" b="0"/>
+          </a:lnRef>
+          <a:fillRef idx="0">
+            <a:scrgbClr r="0" g="0" b="0"/>
+          </a:fillRef>
+          <a:effectRef idx="0">
+            <a:scrgbClr r="0" g="0" b="0"/>
+          </a:effectRef>
           <a:fontRef idx="minor"/>
         </p:style>
         <p:txBody>
-          <a:bodyPr lIns="90000" rIns="90000" tIns="45000" bIns="45000"/>
+          <a:bodyPr lIns="90000" tIns="45000" rIns="90000" bIns="45000"/>
+          <a:lstStyle/>
           <a:p>
             <a:pPr algn="ctr">
               <a:lnSpc>
@@ -3104,7 +3366,7 @@
             <a:r>
               <a:rPr lang="en-US" sz="2400" strike="noStrike">
                 <a:solidFill>
-                  <a:srgbClr val="ffffff"/>
+                  <a:srgbClr val="FFFFFF"/>
                 </a:solidFill>
                 <a:latin typeface="Courier New"/>
               </a:rPr>
@@ -3116,22 +3378,25 @@
       </p:sp>
     </p:spTree>
   </p:cSld>
+  <p:clrMapOvr>
+    <a:masterClrMapping/>
+  </p:clrMapOvr>
   <p:timing>
     <p:tnLst>
       <p:par>
-        <p:cTn id="1" dur="indefinite" restart="never" nodeType="tmRoot">
+        <p:cTn xmlns:p14="http://schemas.microsoft.com/office/powerpoint/2010/main" id="1" dur="indefinite" restart="never" nodeType="tmRoot">
           <p:childTnLst>
             <p:seq>
               <p:cTn id="2" nodeType="mainSeq"/>
               <p:prevCondLst>
-                <p:cond delay="0" evt="onPrev">
+                <p:cond evt="onPrev" delay="0">
                   <p:tgtEl>
                     <p:sldTgt/>
                   </p:tgtEl>
                 </p:cond>
               </p:prevCondLst>
               <p:nextCondLst>
-                <p:cond delay="0" evt="onNext">
+                <p:cond evt="onNext" delay="0">
                   <p:tgtEl>
                     <p:sldTgt/>
                   </p:tgtEl>
@@ -3147,7 +3412,7 @@
 </file>
 
 <file path=ppt/slides/slide2.xml><?xml version="1.0" encoding="utf-8"?>
-<p:sld xmlns:a="http://schemas.openxmlformats.org/drawingml/2006/main" xmlns:p="http://schemas.openxmlformats.org/presentationml/2006/main" xmlns:r="http://schemas.openxmlformats.org/officeDocument/2006/relationships">
+<p:sld xmlns:a="http://schemas.openxmlformats.org/drawingml/2006/main" xmlns:r="http://schemas.openxmlformats.org/officeDocument/2006/relationships" xmlns:p="http://schemas.openxmlformats.org/presentationml/2006/main">
   <p:cSld>
     <p:spTree>
       <p:nvGrpSpPr>
@@ -3165,12 +3430,12 @@
       </p:grpSpPr>
       <p:pic>
         <p:nvPicPr>
-          <p:cNvPr id="80" name="Picture 3" descr=""/>
+          <p:cNvPr id="80" name="Picture 3"/>
           <p:cNvPicPr/>
           <p:nvPr/>
         </p:nvPicPr>
         <p:blipFill>
-          <a:blip r:embed="rId1"/>
+          <a:blip r:embed="rId2"/>
           <a:stretch/>
         </p:blipFill>
         <p:spPr>
@@ -3206,13 +3471,20 @@
           </a:ln>
         </p:spPr>
         <p:style>
-          <a:lnRef idx="0"/>
-          <a:fillRef idx="0"/>
-          <a:effectRef idx="0"/>
+          <a:lnRef idx="0">
+            <a:scrgbClr r="0" g="0" b="0"/>
+          </a:lnRef>
+          <a:fillRef idx="0">
+            <a:scrgbClr r="0" g="0" b="0"/>
+          </a:fillRef>
+          <a:effectRef idx="0">
+            <a:scrgbClr r="0" g="0" b="0"/>
+          </a:effectRef>
           <a:fontRef idx="minor"/>
         </p:style>
         <p:txBody>
-          <a:bodyPr lIns="90000" rIns="90000" tIns="45000" bIns="45000"/>
+          <a:bodyPr lIns="90000" tIns="45000" rIns="90000" bIns="45000"/>
+          <a:lstStyle/>
           <a:p>
             <a:pPr algn="ctr">
               <a:lnSpc>
@@ -3222,7 +3494,7 @@
             <a:r>
               <a:rPr lang="en-US" sz="2400" strike="noStrike">
                 <a:solidFill>
-                  <a:srgbClr val="ffffff"/>
+                  <a:srgbClr val="FFFFFF"/>
                 </a:solidFill>
                 <a:latin typeface="Courier New"/>
               </a:rPr>
@@ -3234,22 +3506,25 @@
       </p:sp>
     </p:spTree>
   </p:cSld>
+  <p:clrMapOvr>
+    <a:masterClrMapping/>
+  </p:clrMapOvr>
   <p:timing>
     <p:tnLst>
       <p:par>
-        <p:cTn id="3" dur="indefinite" restart="never" nodeType="tmRoot">
+        <p:cTn xmlns:p14="http://schemas.microsoft.com/office/powerpoint/2010/main" id="1" dur="indefinite" restart="never" nodeType="tmRoot">
           <p:childTnLst>
             <p:seq>
-              <p:cTn id="4" nodeType="mainSeq"/>
+              <p:cTn id="2" nodeType="mainSeq"/>
               <p:prevCondLst>
-                <p:cond delay="0" evt="onPrev">
+                <p:cond evt="onPrev" delay="0">
                   <p:tgtEl>
                     <p:sldTgt/>
                   </p:tgtEl>
                 </p:cond>
               </p:prevCondLst>
               <p:nextCondLst>
-                <p:cond delay="0" evt="onNext">
+                <p:cond evt="onNext" delay="0">
                   <p:tgtEl>
                     <p:sldTgt/>
                   </p:tgtEl>
@@ -3265,7 +3540,7 @@
 </file>
 
 <file path=ppt/slides/slide3.xml><?xml version="1.0" encoding="utf-8"?>
-<p:sld xmlns:a="http://schemas.openxmlformats.org/drawingml/2006/main" xmlns:p="http://schemas.openxmlformats.org/presentationml/2006/main" xmlns:r="http://schemas.openxmlformats.org/officeDocument/2006/relationships">
+<p:sld xmlns:a="http://schemas.openxmlformats.org/drawingml/2006/main" xmlns:r="http://schemas.openxmlformats.org/officeDocument/2006/relationships" xmlns:p="http://schemas.openxmlformats.org/presentationml/2006/main">
   <p:cSld>
     <p:spTree>
       <p:nvGrpSpPr>
@@ -3301,13 +3576,20 @@
           </a:ln>
         </p:spPr>
         <p:style>
-          <a:lnRef idx="0"/>
-          <a:fillRef idx="0"/>
-          <a:effectRef idx="0"/>
+          <a:lnRef idx="0">
+            <a:scrgbClr r="0" g="0" b="0"/>
+          </a:lnRef>
+          <a:fillRef idx="0">
+            <a:scrgbClr r="0" g="0" b="0"/>
+          </a:fillRef>
+          <a:effectRef idx="0">
+            <a:scrgbClr r="0" g="0" b="0"/>
+          </a:effectRef>
           <a:fontRef idx="minor"/>
         </p:style>
         <p:txBody>
-          <a:bodyPr lIns="90000" rIns="90000" tIns="45000" bIns="45000"/>
+          <a:bodyPr lIns="90000" tIns="45000" rIns="90000" bIns="45000"/>
+          <a:lstStyle/>
           <a:p>
             <a:pPr algn="ctr">
               <a:lnSpc>
@@ -3317,7 +3599,7 @@
             <a:r>
               <a:rPr lang="en-US" sz="2400" strike="noStrike">
                 <a:solidFill>
-                  <a:srgbClr val="ffffff"/>
+                  <a:srgbClr val="FFFFFF"/>
                 </a:solidFill>
                 <a:latin typeface="Courier New"/>
               </a:rPr>
@@ -3329,12 +3611,12 @@
       </p:sp>
       <p:pic>
         <p:nvPicPr>
-          <p:cNvPr id="83" name="Picture 3" descr=""/>
+          <p:cNvPr id="83" name="Picture 3"/>
           <p:cNvPicPr/>
           <p:nvPr/>
         </p:nvPicPr>
         <p:blipFill>
-          <a:blip r:embed="rId1"/>
+          <a:blip r:embed="rId2"/>
           <a:stretch/>
         </p:blipFill>
         <p:spPr>
@@ -3352,22 +3634,25 @@
       </p:pic>
     </p:spTree>
   </p:cSld>
+  <p:clrMapOvr>
+    <a:masterClrMapping/>
+  </p:clrMapOvr>
   <p:timing>
     <p:tnLst>
       <p:par>
-        <p:cTn id="5" dur="indefinite" restart="never" nodeType="tmRoot">
+        <p:cTn xmlns:p14="http://schemas.microsoft.com/office/powerpoint/2010/main" id="1" dur="indefinite" restart="never" nodeType="tmRoot">
           <p:childTnLst>
             <p:seq>
-              <p:cTn id="6" nodeType="mainSeq"/>
+              <p:cTn id="2" nodeType="mainSeq"/>
               <p:prevCondLst>
-                <p:cond delay="0" evt="onPrev">
+                <p:cond evt="onPrev" delay="0">
                   <p:tgtEl>
                     <p:sldTgt/>
                   </p:tgtEl>
                 </p:cond>
               </p:prevCondLst>
               <p:nextCondLst>
-                <p:cond delay="0" evt="onNext">
+                <p:cond evt="onNext" delay="0">
                   <p:tgtEl>
                     <p:sldTgt/>
                   </p:tgtEl>
@@ -3383,7 +3668,7 @@
 </file>
 
 <file path=ppt/slides/slide4.xml><?xml version="1.0" encoding="utf-8"?>
-<p:sld xmlns:a="http://schemas.openxmlformats.org/drawingml/2006/main" xmlns:p="http://schemas.openxmlformats.org/presentationml/2006/main" xmlns:r="http://schemas.openxmlformats.org/officeDocument/2006/relationships">
+<p:sld xmlns:a="http://schemas.openxmlformats.org/drawingml/2006/main" xmlns:r="http://schemas.openxmlformats.org/officeDocument/2006/relationships" xmlns:p="http://schemas.openxmlformats.org/presentationml/2006/main">
   <p:cSld>
     <p:spTree>
       <p:nvGrpSpPr>
@@ -3401,12 +3686,12 @@
       </p:grpSpPr>
       <p:pic>
         <p:nvPicPr>
-          <p:cNvPr id="84" name="Picture 3" descr=""/>
+          <p:cNvPr id="84" name="Picture 3"/>
           <p:cNvPicPr/>
           <p:nvPr/>
         </p:nvPicPr>
         <p:blipFill>
-          <a:blip r:embed="rId1"/>
+          <a:blip r:embed="rId2"/>
           <a:stretch/>
         </p:blipFill>
         <p:spPr>
@@ -3424,22 +3709,25 @@
       </p:pic>
     </p:spTree>
   </p:cSld>
+  <p:clrMapOvr>
+    <a:masterClrMapping/>
+  </p:clrMapOvr>
   <p:timing>
     <p:tnLst>
       <p:par>
-        <p:cTn id="7" dur="indefinite" restart="never" nodeType="tmRoot">
+        <p:cTn xmlns:p14="http://schemas.microsoft.com/office/powerpoint/2010/main" id="1" dur="indefinite" restart="never" nodeType="tmRoot">
           <p:childTnLst>
             <p:seq>
-              <p:cTn id="8" nodeType="mainSeq"/>
+              <p:cTn id="2" nodeType="mainSeq"/>
               <p:prevCondLst>
-                <p:cond delay="0" evt="onPrev">
+                <p:cond evt="onPrev" delay="0">
                   <p:tgtEl>
                     <p:sldTgt/>
                   </p:tgtEl>
                 </p:cond>
               </p:prevCondLst>
               <p:nextCondLst>
-                <p:cond delay="0" evt="onNext">
+                <p:cond evt="onNext" delay="0">
                   <p:tgtEl>
                     <p:sldTgt/>
                   </p:tgtEl>
@@ -3455,7 +3743,7 @@
 </file>
 
 <file path=ppt/slides/slide5.xml><?xml version="1.0" encoding="utf-8"?>
-<p:sld xmlns:a="http://schemas.openxmlformats.org/drawingml/2006/main" xmlns:p="http://schemas.openxmlformats.org/presentationml/2006/main" xmlns:r="http://schemas.openxmlformats.org/officeDocument/2006/relationships">
+<p:sld xmlns:a="http://schemas.openxmlformats.org/drawingml/2006/main" xmlns:r="http://schemas.openxmlformats.org/officeDocument/2006/relationships" xmlns:p="http://schemas.openxmlformats.org/presentationml/2006/main">
   <p:cSld>
     <p:spTree>
       <p:nvGrpSpPr>
@@ -3473,30 +3761,7 @@
       </p:grpSpPr>
       <p:pic>
         <p:nvPicPr>
-          <p:cNvPr id="85" name="Picture 3" descr=""/>
-          <p:cNvPicPr/>
-          <p:nvPr/>
-        </p:nvPicPr>
-        <p:blipFill>
-          <a:blip r:embed="rId1"/>
-          <a:stretch/>
-        </p:blipFill>
-        <p:spPr>
-          <a:xfrm>
-            <a:off x="0" y="0"/>
-            <a:ext cx="9143640" cy="2980800"/>
-          </a:xfrm>
-          <a:prstGeom prst="rect">
-            <a:avLst/>
-          </a:prstGeom>
-          <a:ln>
-            <a:noFill/>
-          </a:ln>
-        </p:spPr>
-      </p:pic>
-      <p:pic>
-        <p:nvPicPr>
-          <p:cNvPr id="86" name="Picture 4" descr=""/>
+          <p:cNvPr id="85" name="Picture 3"/>
           <p:cNvPicPr/>
           <p:nvPr/>
         </p:nvPicPr>
@@ -3506,8 +3771,8 @@
         </p:blipFill>
         <p:spPr>
           <a:xfrm>
-            <a:off x="0" y="2981160"/>
-            <a:ext cx="9143640" cy="3876480"/>
+            <a:off x="0" y="0"/>
+            <a:ext cx="9143640" cy="2980800"/>
           </a:xfrm>
           <a:prstGeom prst="rect">
             <a:avLst/>
@@ -3517,24 +3782,50 @@
           </a:ln>
         </p:spPr>
       </p:pic>
+      <p:pic>
+        <p:nvPicPr>
+          <p:cNvPr id="86" name="Picture 4"/>
+          <p:cNvPicPr/>
+          <p:nvPr/>
+        </p:nvPicPr>
+        <p:blipFill>
+          <a:blip r:embed="rId3"/>
+          <a:stretch/>
+        </p:blipFill>
+        <p:spPr>
+          <a:xfrm>
+            <a:off x="0" y="2981160"/>
+            <a:ext cx="9143640" cy="3876480"/>
+          </a:xfrm>
+          <a:prstGeom prst="rect">
+            <a:avLst/>
+          </a:prstGeom>
+          <a:ln>
+            <a:noFill/>
+          </a:ln>
+        </p:spPr>
+      </p:pic>
     </p:spTree>
   </p:cSld>
+  <p:clrMapOvr>
+    <a:masterClrMapping/>
+  </p:clrMapOvr>
   <p:timing>
     <p:tnLst>
       <p:par>
-        <p:cTn id="9" dur="indefinite" restart="never" nodeType="tmRoot">
+        <p:cTn xmlns:p14="http://schemas.microsoft.com/office/powerpoint/2010/main" id="1" dur="indefinite" restart="never" nodeType="tmRoot">
           <p:childTnLst>
             <p:seq>
-              <p:cTn id="10" nodeType="mainSeq"/>
+              <p:cTn id="2" nodeType="mainSeq"/>
               <p:prevCondLst>
-                <p:cond delay="0" evt="onPrev">
+                <p:cond evt="onPrev" delay="0">
                   <p:tgtEl>
                     <p:sldTgt/>
                   </p:tgtEl>
                 </p:cond>
               </p:prevCondLst>
               <p:nextCondLst>
-                <p:cond delay="0" evt="onNext">
+                <p:cond evt="onNext" delay="0">
                   <p:tgtEl>
                     <p:sldTgt/>
                   </p:tgtEl>
@@ -3550,7 +3841,7 @@
 </file>
 
 <file path=ppt/slides/slide6.xml><?xml version="1.0" encoding="utf-8"?>
-<p:sld xmlns:a="http://schemas.openxmlformats.org/drawingml/2006/main" xmlns:p="http://schemas.openxmlformats.org/presentationml/2006/main" xmlns:r="http://schemas.openxmlformats.org/officeDocument/2006/relationships">
+<p:sld xmlns:a="http://schemas.openxmlformats.org/drawingml/2006/main" xmlns:r="http://schemas.openxmlformats.org/officeDocument/2006/relationships" xmlns:p="http://schemas.openxmlformats.org/presentationml/2006/main">
   <p:cSld>
     <p:spTree>
       <p:nvGrpSpPr>
@@ -3568,12 +3859,12 @@
       </p:grpSpPr>
       <p:pic>
         <p:nvPicPr>
-          <p:cNvPr id="87" name="Picture 3" descr=""/>
+          <p:cNvPr id="87" name="Picture 3"/>
           <p:cNvPicPr/>
           <p:nvPr/>
         </p:nvPicPr>
         <p:blipFill>
-          <a:blip r:embed="rId1"/>
+          <a:blip r:embed="rId2"/>
           <a:stretch/>
         </p:blipFill>
         <p:spPr>
@@ -3591,22 +3882,25 @@
       </p:pic>
     </p:spTree>
   </p:cSld>
+  <p:clrMapOvr>
+    <a:masterClrMapping/>
+  </p:clrMapOvr>
   <p:timing>
     <p:tnLst>
       <p:par>
-        <p:cTn id="11" dur="indefinite" restart="never" nodeType="tmRoot">
+        <p:cTn xmlns:p14="http://schemas.microsoft.com/office/powerpoint/2010/main" id="1" dur="indefinite" restart="never" nodeType="tmRoot">
           <p:childTnLst>
             <p:seq>
-              <p:cTn id="12" nodeType="mainSeq"/>
+              <p:cTn id="2" nodeType="mainSeq"/>
               <p:prevCondLst>
-                <p:cond delay="0" evt="onPrev">
+                <p:cond evt="onPrev" delay="0">
                   <p:tgtEl>
                     <p:sldTgt/>
                   </p:tgtEl>
                 </p:cond>
               </p:prevCondLst>
               <p:nextCondLst>
-                <p:cond delay="0" evt="onNext">
+                <p:cond evt="onNext" delay="0">
                   <p:tgtEl>
                     <p:sldTgt/>
                   </p:tgtEl>
@@ -3622,7 +3916,7 @@
 </file>
 
 <file path=ppt/slides/slide7.xml><?xml version="1.0" encoding="utf-8"?>
-<p:sld xmlns:a="http://schemas.openxmlformats.org/drawingml/2006/main" xmlns:p="http://schemas.openxmlformats.org/presentationml/2006/main" xmlns:r="http://schemas.openxmlformats.org/officeDocument/2006/relationships">
+<p:sld xmlns:a="http://schemas.openxmlformats.org/drawingml/2006/main" xmlns:r="http://schemas.openxmlformats.org/officeDocument/2006/relationships" xmlns:p="http://schemas.openxmlformats.org/presentationml/2006/main">
   <p:cSld>
     <p:spTree>
       <p:nvGrpSpPr>
@@ -3640,30 +3934,7 @@
       </p:grpSpPr>
       <p:pic>
         <p:nvPicPr>
-          <p:cNvPr id="88" name="Picture 3" descr=""/>
-          <p:cNvPicPr/>
-          <p:nvPr/>
-        </p:nvPicPr>
-        <p:blipFill>
-          <a:blip r:embed="rId1"/>
-          <a:stretch/>
-        </p:blipFill>
-        <p:spPr>
-          <a:xfrm>
-            <a:off x="1006200" y="0"/>
-            <a:ext cx="7238520" cy="1704600"/>
-          </a:xfrm>
-          <a:prstGeom prst="rect">
-            <a:avLst/>
-          </a:prstGeom>
-          <a:ln>
-            <a:noFill/>
-          </a:ln>
-        </p:spPr>
-      </p:pic>
-      <p:pic>
-        <p:nvPicPr>
-          <p:cNvPr id="89" name="Picture 4" descr=""/>
+          <p:cNvPr id="88" name="Picture 3"/>
           <p:cNvPicPr/>
           <p:nvPr/>
         </p:nvPicPr>
@@ -3673,8 +3944,8 @@
         </p:blipFill>
         <p:spPr>
           <a:xfrm>
-            <a:off x="0" y="2513160"/>
-            <a:ext cx="9143640" cy="3903120"/>
+            <a:off x="1006200" y="0"/>
+            <a:ext cx="7238520" cy="1704600"/>
           </a:xfrm>
           <a:prstGeom prst="rect">
             <a:avLst/>
@@ -3684,24 +3955,50 @@
           </a:ln>
         </p:spPr>
       </p:pic>
+      <p:pic>
+        <p:nvPicPr>
+          <p:cNvPr id="89" name="Picture 4"/>
+          <p:cNvPicPr/>
+          <p:nvPr/>
+        </p:nvPicPr>
+        <p:blipFill>
+          <a:blip r:embed="rId3"/>
+          <a:stretch/>
+        </p:blipFill>
+        <p:spPr>
+          <a:xfrm>
+            <a:off x="0" y="2513160"/>
+            <a:ext cx="9143640" cy="3903120"/>
+          </a:xfrm>
+          <a:prstGeom prst="rect">
+            <a:avLst/>
+          </a:prstGeom>
+          <a:ln>
+            <a:noFill/>
+          </a:ln>
+        </p:spPr>
+      </p:pic>
     </p:spTree>
   </p:cSld>
+  <p:clrMapOvr>
+    <a:masterClrMapping/>
+  </p:clrMapOvr>
   <p:timing>
     <p:tnLst>
       <p:par>
-        <p:cTn id="13" dur="indefinite" restart="never" nodeType="tmRoot">
+        <p:cTn xmlns:p14="http://schemas.microsoft.com/office/powerpoint/2010/main" id="1" dur="indefinite" restart="never" nodeType="tmRoot">
           <p:childTnLst>
             <p:seq>
-              <p:cTn id="14" nodeType="mainSeq"/>
+              <p:cTn id="2" nodeType="mainSeq"/>
               <p:prevCondLst>
-                <p:cond delay="0" evt="onPrev">
+                <p:cond evt="onPrev" delay="0">
                   <p:tgtEl>
                     <p:sldTgt/>
                   </p:tgtEl>
                 </p:cond>
               </p:prevCondLst>
               <p:nextCondLst>
-                <p:cond delay="0" evt="onNext">
+                <p:cond evt="onNext" delay="0">
                   <p:tgtEl>
                     <p:sldTgt/>
                   </p:tgtEl>
@@ -3710,6 +4007,183 @@
             </p:seq>
           </p:childTnLst>
         </p:cTn>
+      </p:par>
+    </p:tnLst>
+  </p:timing>
+</p:sld>
+</file>
+
+<file path=ppt/slides/slide8.xml><?xml version="1.0" encoding="utf-8"?>
+<p:sld xmlns:a="http://schemas.openxmlformats.org/drawingml/2006/main" xmlns:r="http://schemas.openxmlformats.org/officeDocument/2006/relationships" xmlns:p="http://schemas.openxmlformats.org/presentationml/2006/main">
+  <p:cSld>
+    <p:spTree>
+      <p:nvGrpSpPr>
+        <p:cNvPr id="1" name=""/>
+        <p:cNvGrpSpPr/>
+        <p:nvPr/>
+      </p:nvGrpSpPr>
+      <p:grpSpPr>
+        <a:xfrm>
+          <a:off x="0" y="0"/>
+          <a:ext cx="0" cy="0"/>
+          <a:chOff x="0" y="0"/>
+          <a:chExt cx="0" cy="0"/>
+        </a:xfrm>
+      </p:grpSpPr>
+      <p:pic>
+        <p:nvPicPr>
+          <p:cNvPr id="4" name="Picture 3" descr="ComponentDiagram.jpg"/>
+          <p:cNvPicPr>
+            <a:picLocks noChangeAspect="1"/>
+          </p:cNvPicPr>
+          <p:nvPr/>
+        </p:nvPicPr>
+        <p:blipFill>
+          <a:blip r:embed="rId2">
+            <a:extLst>
+              <a:ext uri="{28A0092B-C50C-407E-A947-70E740481C1C}">
+                <a14:useLocalDpi xmlns:a14="http://schemas.microsoft.com/office/drawing/2010/main" val="0"/>
+              </a:ext>
+            </a:extLst>
+          </a:blip>
+          <a:stretch>
+            <a:fillRect/>
+          </a:stretch>
+        </p:blipFill>
+        <p:spPr>
+          <a:xfrm>
+            <a:off x="0" y="1367146"/>
+            <a:ext cx="9144000" cy="4325778"/>
+          </a:xfrm>
+          <a:prstGeom prst="rect">
+            <a:avLst/>
+          </a:prstGeom>
+        </p:spPr>
+      </p:pic>
+      <p:sp>
+        <p:nvSpPr>
+          <p:cNvPr id="7" name="TextBox 6"/>
+          <p:cNvSpPr txBox="1"/>
+          <p:nvPr/>
+        </p:nvSpPr>
+        <p:spPr>
+          <a:xfrm>
+            <a:off x="0" y="214441"/>
+            <a:ext cx="9144000" cy="461665"/>
+          </a:xfrm>
+          <a:prstGeom prst="rect">
+            <a:avLst/>
+          </a:prstGeom>
+          <a:noFill/>
+        </p:spPr>
+        <p:txBody>
+          <a:bodyPr wrap="square" rtlCol="0">
+            <a:spAutoFit/>
+          </a:bodyPr>
+          <a:lstStyle/>
+          <a:p>
+            <a:pPr algn="ctr"/>
+            <a:r>
+              <a:rPr lang="en-US" sz="2400" dirty="0" smtClean="0">
+                <a:solidFill>
+                  <a:schemeClr val="bg1"/>
+                </a:solidFill>
+                <a:latin typeface="Courier New"/>
+                <a:cs typeface="Courier New"/>
+              </a:rPr>
+              <a:t>Map Module</a:t>
+            </a:r>
+            <a:endParaRPr lang="en-US" sz="2400" dirty="0">
+              <a:solidFill>
+                <a:schemeClr val="bg1"/>
+              </a:solidFill>
+              <a:latin typeface="Courier New"/>
+              <a:cs typeface="Courier New"/>
+            </a:endParaRPr>
+          </a:p>
+        </p:txBody>
+      </p:sp>
+    </p:spTree>
+    <p:extLst>
+      <p:ext uri="{BB962C8B-B14F-4D97-AF65-F5344CB8AC3E}">
+        <p14:creationId xmlns:p14="http://schemas.microsoft.com/office/powerpoint/2010/main" val="714099483"/>
+      </p:ext>
+    </p:extLst>
+  </p:cSld>
+  <p:clrMapOvr>
+    <a:masterClrMapping/>
+  </p:clrMapOvr>
+  <p:timing>
+    <p:tnLst>
+      <p:par>
+        <p:cTn xmlns:p14="http://schemas.microsoft.com/office/powerpoint/2010/main" id="1" dur="indefinite" restart="never" nodeType="tmRoot"/>
+      </p:par>
+    </p:tnLst>
+  </p:timing>
+</p:sld>
+</file>
+
+<file path=ppt/slides/slide9.xml><?xml version="1.0" encoding="utf-8"?>
+<p:sld xmlns:a="http://schemas.openxmlformats.org/drawingml/2006/main" xmlns:r="http://schemas.openxmlformats.org/officeDocument/2006/relationships" xmlns:p="http://schemas.openxmlformats.org/presentationml/2006/main">
+  <p:cSld>
+    <p:spTree>
+      <p:nvGrpSpPr>
+        <p:cNvPr id="1" name=""/>
+        <p:cNvGrpSpPr/>
+        <p:nvPr/>
+      </p:nvGrpSpPr>
+      <p:grpSpPr>
+        <a:xfrm>
+          <a:off x="0" y="0"/>
+          <a:ext cx="0" cy="0"/>
+          <a:chOff x="0" y="0"/>
+          <a:chExt cx="0" cy="0"/>
+        </a:xfrm>
+      </p:grpSpPr>
+      <p:pic>
+        <p:nvPicPr>
+          <p:cNvPr id="4" name="Picture 3" descr="Class Diagrem.jpeg"/>
+          <p:cNvPicPr>
+            <a:picLocks noChangeAspect="1"/>
+          </p:cNvPicPr>
+          <p:nvPr/>
+        </p:nvPicPr>
+        <p:blipFill>
+          <a:blip r:embed="rId2">
+            <a:extLst>
+              <a:ext uri="{28A0092B-C50C-407E-A947-70E740481C1C}">
+                <a14:useLocalDpi xmlns:a14="http://schemas.microsoft.com/office/drawing/2010/main" val="0"/>
+              </a:ext>
+            </a:extLst>
+          </a:blip>
+          <a:stretch>
+            <a:fillRect/>
+          </a:stretch>
+        </p:blipFill>
+        <p:spPr>
+          <a:xfrm>
+            <a:off x="0" y="931333"/>
+            <a:ext cx="9144000" cy="5926667"/>
+          </a:xfrm>
+          <a:prstGeom prst="rect">
+            <a:avLst/>
+          </a:prstGeom>
+        </p:spPr>
+      </p:pic>
+    </p:spTree>
+    <p:extLst>
+      <p:ext uri="{BB962C8B-B14F-4D97-AF65-F5344CB8AC3E}">
+        <p14:creationId xmlns:p14="http://schemas.microsoft.com/office/powerpoint/2010/main" val="1745051809"/>
+      </p:ext>
+    </p:extLst>
+  </p:cSld>
+  <p:clrMapOvr>
+    <a:masterClrMapping/>
+  </p:clrMapOvr>
+  <p:timing>
+    <p:tnLst>
+      <p:par>
+        <p:cTn xmlns:p14="http://schemas.microsoft.com/office/powerpoint/2010/main" id="1" dur="indefinite" restart="never" nodeType="tmRoot"/>
       </p:par>
     </p:tnLst>
   </p:timing>
@@ -3936,6 +4410,8 @@
       </a:bgFillStyleLst>
     </a:fmtScheme>
   </a:themeElements>
+  <a:objectDefaults/>
+  <a:extraClrSchemeLst/>
 </a:theme>
 </file>
 
@@ -4159,5 +4635,7 @@
       </a:bgFillStyleLst>
     </a:fmtScheme>
   </a:themeElements>
+  <a:objectDefaults/>
+  <a:extraClrSchemeLst/>
 </a:theme>
 </file>
</xml_diff>